<commit_message>
add p value to slides
</commit_message>
<xml_diff>
--- a/Presentation/Auto_sales_Michelle.pptx
+++ b/Presentation/Auto_sales_Michelle.pptx
@@ -2779,7 +2779,7 @@
           <a:effectLst/>
           <a:extLst>
             <a:ext uri="{91240B29-F687-4f45-9708-019B960494DF}">
-              <a14:hiddenLine xmlns="" xmlns:a14="http://schemas.microsoft.com/office/drawing/2010/main" w="9525">
+              <a14:hiddenLine xmlns:a14="http://schemas.microsoft.com/office/drawing/2010/main" xmlns="" w="9525">
                 <a:solidFill>
                   <a:srgbClr val="000000"/>
                 </a:solidFill>
@@ -2972,7 +2972,7 @@
             <a:fld id="{08B9EBBA-996F-894A-B54A-D6246ED52CEA}" type="datetimeFigureOut">
               <a:rPr lang="en-US" dirty="0"/>
               <a:pPr/>
-              <a:t>8/13/21</a:t>
+              <a:t>8/14/21</a:t>
             </a:fld>
             <a:endParaRPr lang="en-US" dirty="0"/>
           </a:p>
@@ -3287,7 +3287,7 @@
             <a:fld id="{18C79C5D-2A6F-F04D-97DA-BEF2467B64E4}" type="datetimeFigureOut">
               <a:rPr lang="en-US" dirty="0"/>
               <a:pPr/>
-              <a:t>8/13/21</a:t>
+              <a:t>8/14/21</a:t>
             </a:fld>
             <a:endParaRPr lang="en-US" dirty="0"/>
           </a:p>
@@ -3772,7 +3772,7 @@
             <a:fld id="{8DFA1846-DA80-1C48-A609-854EA85C59AD}" type="datetimeFigureOut">
               <a:rPr lang="en-US" dirty="0"/>
               <a:pPr/>
-              <a:t>8/13/21</a:t>
+              <a:t>8/14/21</a:t>
             </a:fld>
             <a:endParaRPr lang="en-US" dirty="0"/>
           </a:p>
@@ -4138,7 +4138,7 @@
             <a:fld id="{FBF54567-0DE4-3F47-BF90-CB84690072F9}" type="datetimeFigureOut">
               <a:rPr lang="en-US" dirty="0"/>
               <a:pPr/>
-              <a:t>8/13/21</a:t>
+              <a:t>8/14/21</a:t>
             </a:fld>
             <a:endParaRPr lang="en-US" dirty="0"/>
           </a:p>
@@ -4289,7 +4289,7 @@
           <a:ln/>
           <a:extLst>
             <a:ext uri="{91240B29-F687-4f45-9708-019B960494DF}">
-              <a14:hiddenLine xmlns="" xmlns:a14="http://schemas.microsoft.com/office/drawing/2010/main" w="9525">
+              <a14:hiddenLine xmlns:a14="http://schemas.microsoft.com/office/drawing/2010/main" xmlns="" w="9525">
                 <a:solidFill>
                   <a:srgbClr val="000000"/>
                 </a:solidFill>
@@ -4408,7 +4408,7 @@
             <a:fld id="{C6C52C72-DE31-F449-A4ED-4C594FD91407}" type="datetimeFigureOut">
               <a:rPr lang="en-US" dirty="0"/>
               <a:pPr/>
-              <a:t>8/13/21</a:t>
+              <a:t>8/14/21</a:t>
             </a:fld>
             <a:endParaRPr lang="en-US" dirty="0"/>
           </a:p>
@@ -4561,7 +4561,7 @@
           <a:ln/>
           <a:extLst>
             <a:ext uri="{91240B29-F687-4f45-9708-019B960494DF}">
-              <a14:hiddenLine xmlns="" xmlns:a14="http://schemas.microsoft.com/office/drawing/2010/main" w="9525">
+              <a14:hiddenLine xmlns:a14="http://schemas.microsoft.com/office/drawing/2010/main" xmlns="" w="9525">
                 <a:solidFill>
                   <a:srgbClr val="000000"/>
                 </a:solidFill>
@@ -4690,7 +4690,7 @@
             <a:fld id="{ED62726E-379B-B349-9EED-81ED093FA806}" type="datetimeFigureOut">
               <a:rPr lang="en-US" dirty="0"/>
               <a:pPr/>
-              <a:t>8/13/21</a:t>
+              <a:t>8/14/21</a:t>
             </a:fld>
             <a:endParaRPr lang="en-US" dirty="0"/>
           </a:p>
@@ -4841,7 +4841,7 @@
           <a:ln/>
           <a:extLst>
             <a:ext uri="{91240B29-F687-4f45-9708-019B960494DF}">
-              <a14:hiddenLine xmlns="" xmlns:a14="http://schemas.microsoft.com/office/drawing/2010/main" w="9525">
+              <a14:hiddenLine xmlns:a14="http://schemas.microsoft.com/office/drawing/2010/main" xmlns="" w="9525">
                 <a:solidFill>
                   <a:srgbClr val="000000"/>
                 </a:solidFill>
@@ -4970,7 +4970,7 @@
             <a:fld id="{9B3A1323-8D79-1946-B0D7-40001CF92E9D}" type="datetimeFigureOut">
               <a:rPr lang="en-US" dirty="0"/>
               <a:pPr/>
-              <a:t>8/13/21</a:t>
+              <a:t>8/14/21</a:t>
             </a:fld>
             <a:endParaRPr lang="en-US" dirty="0"/>
           </a:p>
@@ -5310,7 +5310,7 @@
             <a:fld id="{8DFA1846-DA80-1C48-A609-854EA85C59AD}" type="datetimeFigureOut">
               <a:rPr lang="en-US" dirty="0"/>
               <a:pPr/>
-              <a:t>8/13/21</a:t>
+              <a:t>8/14/21</a:t>
             </a:fld>
             <a:endParaRPr lang="en-US" dirty="0"/>
           </a:p>
@@ -5461,7 +5461,7 @@
           <a:ln/>
           <a:extLst>
             <a:ext uri="{91240B29-F687-4f45-9708-019B960494DF}">
-              <a14:hiddenLine xmlns="" xmlns:a14="http://schemas.microsoft.com/office/drawing/2010/main" w="9525">
+              <a14:hiddenLine xmlns:a14="http://schemas.microsoft.com/office/drawing/2010/main" xmlns="" w="9525">
                 <a:solidFill>
                   <a:srgbClr val="000000"/>
                 </a:solidFill>
@@ -5646,7 +5646,7 @@
             <a:fld id="{57302355-E14B-8545-A8F8-0FE83CC9D524}" type="datetimeFigureOut">
               <a:rPr lang="en-US" dirty="0"/>
               <a:pPr/>
-              <a:t>8/13/21</a:t>
+              <a:t>8/14/21</a:t>
             </a:fld>
             <a:endParaRPr lang="en-US" dirty="0"/>
           </a:p>
@@ -5797,7 +5797,7 @@
           <a:ln/>
           <a:extLst>
             <a:ext uri="{91240B29-F687-4f45-9708-019B960494DF}">
-              <a14:hiddenLine xmlns="" xmlns:a14="http://schemas.microsoft.com/office/drawing/2010/main" w="9525">
+              <a14:hiddenLine xmlns:a14="http://schemas.microsoft.com/office/drawing/2010/main" xmlns="" w="9525">
                 <a:solidFill>
                   <a:srgbClr val="000000"/>
                 </a:solidFill>
@@ -6120,7 +6120,7 @@
             <a:fld id="{02640F58-564D-2B4F-AE67-E407BA4FCF45}" type="datetimeFigureOut">
               <a:rPr lang="en-US" dirty="0"/>
               <a:pPr/>
-              <a:t>8/13/21</a:t>
+              <a:t>8/14/21</a:t>
             </a:fld>
             <a:endParaRPr lang="en-US" dirty="0"/>
           </a:p>
@@ -6271,7 +6271,7 @@
           <a:ln/>
           <a:extLst>
             <a:ext uri="{91240B29-F687-4f45-9708-019B960494DF}">
-              <a14:hiddenLine xmlns="" xmlns:a14="http://schemas.microsoft.com/office/drawing/2010/main" w="9525">
+              <a14:hiddenLine xmlns:a14="http://schemas.microsoft.com/office/drawing/2010/main" xmlns="" w="9525">
                 <a:solidFill>
                   <a:srgbClr val="000000"/>
                 </a:solidFill>
@@ -6338,7 +6338,7 @@
             <a:fld id="{F13A34C8-038E-2045-AF43-DF7DBB8E0E9E}" type="datetimeFigureOut">
               <a:rPr lang="en-US" dirty="0"/>
               <a:pPr/>
-              <a:t>8/13/21</a:t>
+              <a:t>8/14/21</a:t>
             </a:fld>
             <a:endParaRPr lang="en-US" dirty="0"/>
           </a:p>
@@ -6430,7 +6430,7 @@
             <a:fld id="{8818C68F-D26B-8F47-958C-23B49CF8A634}" type="datetimeFigureOut">
               <a:rPr lang="en-US" dirty="0"/>
               <a:pPr/>
-              <a:t>8/13/21</a:t>
+              <a:t>8/14/21</a:t>
             </a:fld>
             <a:endParaRPr lang="en-US" dirty="0"/>
           </a:p>
@@ -6694,7 +6694,7 @@
           <a:ln/>
           <a:extLst>
             <a:ext uri="{91240B29-F687-4f45-9708-019B960494DF}">
-              <a14:hiddenLine xmlns="" xmlns:a14="http://schemas.microsoft.com/office/drawing/2010/main" w="9525">
+              <a14:hiddenLine xmlns:a14="http://schemas.microsoft.com/office/drawing/2010/main" xmlns="" w="9525">
                 <a:solidFill>
                   <a:srgbClr val="000000"/>
                 </a:solidFill>
@@ -6894,7 +6894,7 @@
             <a:fld id="{D0DF5E60-9974-AC48-9591-99C2BB44B7CF}" type="datetimeFigureOut">
               <a:rPr lang="en-US" dirty="0"/>
               <a:pPr/>
-              <a:t>8/13/21</a:t>
+              <a:t>8/14/21</a:t>
             </a:fld>
             <a:endParaRPr lang="en-US" dirty="0"/>
           </a:p>
@@ -7204,7 +7204,7 @@
             <a:fld id="{18C79C5D-2A6F-F04D-97DA-BEF2467B64E4}" type="datetimeFigureOut">
               <a:rPr lang="en-US" dirty="0"/>
               <a:pPr/>
-              <a:t>8/13/21</a:t>
+              <a:t>8/14/21</a:t>
             </a:fld>
             <a:endParaRPr lang="en-US" dirty="0"/>
           </a:p>
@@ -7471,7 +7471,7 @@
             <a:fld id="{09B482E8-6E0E-1B4F-B1FD-C69DB9E858D9}" type="datetimeFigureOut">
               <a:rPr lang="en-US" dirty="0"/>
               <a:pPr/>
-              <a:t>8/13/21</a:t>
+              <a:t>8/14/21</a:t>
             </a:fld>
             <a:endParaRPr lang="en-US" dirty="0"/>
           </a:p>
@@ -8951,1552 +8951,6 @@
       </p:pic>
       <p:graphicFrame>
         <p:nvGraphicFramePr>
-          <p:cNvPr id="3" name="Table 2">
-            <a:extLst>
-              <a:ext uri="{FF2B5EF4-FFF2-40B4-BE49-F238E27FC236}">
-                <a16:creationId xmlns:a16="http://schemas.microsoft.com/office/drawing/2014/main" id="{DF667DCF-B08B-C248-A62E-D6009E50D3B7}"/>
-              </a:ext>
-            </a:extLst>
-          </p:cNvPr>
-          <p:cNvGraphicFramePr>
-            <a:graphicFrameLocks noGrp="1"/>
-          </p:cNvGraphicFramePr>
-          <p:nvPr>
-            <p:extLst>
-              <p:ext uri="{D42A27DB-BD31-4B8C-83A1-F6EECF244321}">
-                <p14:modId xmlns:p14="http://schemas.microsoft.com/office/powerpoint/2010/main" val="997635383"/>
-              </p:ext>
-            </p:extLst>
-          </p:nvPr>
-        </p:nvGraphicFramePr>
-        <p:xfrm>
-          <a:off x="131883" y="3035560"/>
-          <a:ext cx="11928233" cy="3138363"/>
-        </p:xfrm>
-        <a:graphic>
-          <a:graphicData uri="http://schemas.openxmlformats.org/drawingml/2006/table">
-            <a:tbl>
-              <a:tblPr>
-                <a:effectLst/>
-              </a:tblPr>
-              <a:tblGrid>
-                <a:gridCol w="3215219">
-                  <a:extLst>
-                    <a:ext uri="{9D8B030D-6E8A-4147-A177-3AD203B41FA5}">
-                      <a16:colId xmlns:a16="http://schemas.microsoft.com/office/drawing/2014/main" val="147652983"/>
-                    </a:ext>
-                  </a:extLst>
-                </a:gridCol>
-                <a:gridCol w="1106654">
-                  <a:extLst>
-                    <a:ext uri="{9D8B030D-6E8A-4147-A177-3AD203B41FA5}">
-                      <a16:colId xmlns:a16="http://schemas.microsoft.com/office/drawing/2014/main" val="2931340686"/>
-                    </a:ext>
-                  </a:extLst>
-                </a:gridCol>
-                <a:gridCol w="1492937">
-                  <a:extLst>
-                    <a:ext uri="{9D8B030D-6E8A-4147-A177-3AD203B41FA5}">
-                      <a16:colId xmlns:a16="http://schemas.microsoft.com/office/drawing/2014/main" val="2321934148"/>
-                    </a:ext>
-                  </a:extLst>
-                </a:gridCol>
-                <a:gridCol w="6113423">
-                  <a:extLst>
-                    <a:ext uri="{9D8B030D-6E8A-4147-A177-3AD203B41FA5}">
-                      <a16:colId xmlns:a16="http://schemas.microsoft.com/office/drawing/2014/main" val="2935325454"/>
-                    </a:ext>
-                  </a:extLst>
-                </a:gridCol>
-              </a:tblGrid>
-              <a:tr h="636213">
-                <a:tc>
-                  <a:txBody>
-                    <a:bodyPr/>
-                    <a:lstStyle/>
-                    <a:p>
-                      <a:pPr algn="ctr" fontAlgn="b"/>
-                      <a:r>
-                        <a:rPr lang="en-US" sz="1800" b="1" i="0" u="none" strike="noStrike" dirty="0">
-                          <a:solidFill>
-                            <a:srgbClr val="000000"/>
-                          </a:solidFill>
-                          <a:effectLst/>
-                          <a:latin typeface="+mj-lt"/>
-                        </a:rPr>
-                        <a:t>Relationship</a:t>
-                      </a:r>
-                    </a:p>
-                  </a:txBody>
-                  <a:tcPr marL="8401" marR="8401" marT="8401" marB="0" anchor="b">
-                    <a:lnL w="6350" cap="flat" cmpd="sng" algn="ctr">
-                      <a:solidFill>
-                        <a:srgbClr val="000000"/>
-                      </a:solidFill>
-                      <a:prstDash val="solid"/>
-                      <a:round/>
-                      <a:headEnd type="none" w="med" len="med"/>
-                      <a:tailEnd type="none" w="med" len="med"/>
-                    </a:lnL>
-                    <a:lnR w="6350" cap="flat" cmpd="sng" algn="ctr">
-                      <a:solidFill>
-                        <a:srgbClr val="000000"/>
-                      </a:solidFill>
-                      <a:prstDash val="solid"/>
-                      <a:round/>
-                      <a:headEnd type="none" w="med" len="med"/>
-                      <a:tailEnd type="none" w="med" len="med"/>
-                    </a:lnR>
-                    <a:lnT w="6350" cap="flat" cmpd="sng" algn="ctr">
-                      <a:solidFill>
-                        <a:srgbClr val="000000"/>
-                      </a:solidFill>
-                      <a:prstDash val="solid"/>
-                      <a:round/>
-                      <a:headEnd type="none" w="med" len="med"/>
-                      <a:tailEnd type="none" w="med" len="med"/>
-                    </a:lnT>
-                    <a:lnB w="6350" cap="flat" cmpd="sng" algn="ctr">
-                      <a:solidFill>
-                        <a:srgbClr val="000000"/>
-                      </a:solidFill>
-                      <a:prstDash val="solid"/>
-                      <a:round/>
-                      <a:headEnd type="none" w="med" len="med"/>
-                      <a:tailEnd type="none" w="med" len="med"/>
-                    </a:lnB>
-                    <a:solidFill>
-                      <a:schemeClr val="tx1"/>
-                    </a:solidFill>
-                  </a:tcPr>
-                </a:tc>
-                <a:tc>
-                  <a:txBody>
-                    <a:bodyPr/>
-                    <a:lstStyle/>
-                    <a:p>
-                      <a:pPr algn="ctr" fontAlgn="b"/>
-                      <a:r>
-                        <a:rPr lang="en-US" sz="1800" b="1" i="0" u="none" strike="noStrike" dirty="0">
-                          <a:solidFill>
-                            <a:srgbClr val="000000"/>
-                          </a:solidFill>
-                          <a:effectLst/>
-                          <a:latin typeface="+mj-lt"/>
-                        </a:rPr>
-                        <a:t>R²</a:t>
-                      </a:r>
-                    </a:p>
-                  </a:txBody>
-                  <a:tcPr marL="8401" marR="8401" marT="8401" marB="0" anchor="b">
-                    <a:lnL w="6350" cap="flat" cmpd="sng" algn="ctr">
-                      <a:solidFill>
-                        <a:srgbClr val="000000"/>
-                      </a:solidFill>
-                      <a:prstDash val="solid"/>
-                      <a:round/>
-                      <a:headEnd type="none" w="med" len="med"/>
-                      <a:tailEnd type="none" w="med" len="med"/>
-                    </a:lnL>
-                    <a:lnR w="6350" cap="flat" cmpd="sng" algn="ctr">
-                      <a:solidFill>
-                        <a:srgbClr val="000000"/>
-                      </a:solidFill>
-                      <a:prstDash val="solid"/>
-                      <a:round/>
-                      <a:headEnd type="none" w="med" len="med"/>
-                      <a:tailEnd type="none" w="med" len="med"/>
-                    </a:lnR>
-                    <a:lnT w="6350" cap="flat" cmpd="sng" algn="ctr">
-                      <a:solidFill>
-                        <a:srgbClr val="000000"/>
-                      </a:solidFill>
-                      <a:prstDash val="solid"/>
-                      <a:round/>
-                      <a:headEnd type="none" w="med" len="med"/>
-                      <a:tailEnd type="none" w="med" len="med"/>
-                    </a:lnT>
-                    <a:lnB w="6350" cap="flat" cmpd="sng" algn="ctr">
-                      <a:solidFill>
-                        <a:srgbClr val="000000"/>
-                      </a:solidFill>
-                      <a:prstDash val="solid"/>
-                      <a:round/>
-                      <a:headEnd type="none" w="med" len="med"/>
-                      <a:tailEnd type="none" w="med" len="med"/>
-                    </a:lnB>
-                    <a:solidFill>
-                      <a:schemeClr val="tx1"/>
-                    </a:solidFill>
-                  </a:tcPr>
-                </a:tc>
-                <a:tc>
-                  <a:txBody>
-                    <a:bodyPr/>
-                    <a:lstStyle/>
-                    <a:p>
-                      <a:pPr algn="ctr" fontAlgn="b"/>
-                      <a:r>
-                        <a:rPr lang="en-US" sz="1800" b="1" i="0" u="none" strike="noStrike" dirty="0">
-                          <a:solidFill>
-                            <a:srgbClr val="000000"/>
-                          </a:solidFill>
-                          <a:effectLst/>
-                          <a:latin typeface="+mj-lt"/>
-                        </a:rPr>
-                        <a:t>Pearson’s r</a:t>
-                      </a:r>
-                    </a:p>
-                  </a:txBody>
-                  <a:tcPr marL="8401" marR="8401" marT="8401" marB="0" anchor="b">
-                    <a:lnL w="6350" cap="flat" cmpd="sng" algn="ctr">
-                      <a:solidFill>
-                        <a:srgbClr val="000000"/>
-                      </a:solidFill>
-                      <a:prstDash val="solid"/>
-                      <a:round/>
-                      <a:headEnd type="none" w="med" len="med"/>
-                      <a:tailEnd type="none" w="med" len="med"/>
-                    </a:lnL>
-                    <a:lnR w="6350" cap="flat" cmpd="sng" algn="ctr">
-                      <a:solidFill>
-                        <a:srgbClr val="000000"/>
-                      </a:solidFill>
-                      <a:prstDash val="solid"/>
-                      <a:round/>
-                      <a:headEnd type="none" w="med" len="med"/>
-                      <a:tailEnd type="none" w="med" len="med"/>
-                    </a:lnR>
-                    <a:lnT w="6350" cap="flat" cmpd="sng" algn="ctr">
-                      <a:solidFill>
-                        <a:srgbClr val="000000"/>
-                      </a:solidFill>
-                      <a:prstDash val="solid"/>
-                      <a:round/>
-                      <a:headEnd type="none" w="med" len="med"/>
-                      <a:tailEnd type="none" w="med" len="med"/>
-                    </a:lnT>
-                    <a:lnB w="6350" cap="flat" cmpd="sng" algn="ctr">
-                      <a:solidFill>
-                        <a:srgbClr val="000000"/>
-                      </a:solidFill>
-                      <a:prstDash val="solid"/>
-                      <a:round/>
-                      <a:headEnd type="none" w="med" len="med"/>
-                      <a:tailEnd type="none" w="med" len="med"/>
-                    </a:lnB>
-                    <a:solidFill>
-                      <a:schemeClr val="tx1"/>
-                    </a:solidFill>
-                  </a:tcPr>
-                </a:tc>
-                <a:tc>
-                  <a:txBody>
-                    <a:bodyPr/>
-                    <a:lstStyle/>
-                    <a:p>
-                      <a:pPr algn="ctr" fontAlgn="b"/>
-                      <a:r>
-                        <a:rPr lang="en-US" sz="1800" b="1" i="0" u="none" strike="noStrike" dirty="0">
-                          <a:solidFill>
-                            <a:srgbClr val="000000"/>
-                          </a:solidFill>
-                          <a:effectLst/>
-                          <a:latin typeface="+mj-lt"/>
-                        </a:rPr>
-                        <a:t>Meaning</a:t>
-                      </a:r>
-                    </a:p>
-                  </a:txBody>
-                  <a:tcPr marL="8401" marR="8401" marT="8401" marB="0" anchor="b">
-                    <a:lnL w="6350" cap="flat" cmpd="sng" algn="ctr">
-                      <a:solidFill>
-                        <a:srgbClr val="000000"/>
-                      </a:solidFill>
-                      <a:prstDash val="solid"/>
-                      <a:round/>
-                      <a:headEnd type="none" w="med" len="med"/>
-                      <a:tailEnd type="none" w="med" len="med"/>
-                    </a:lnL>
-                    <a:lnR w="6350" cap="flat" cmpd="sng" algn="ctr">
-                      <a:solidFill>
-                        <a:srgbClr val="000000"/>
-                      </a:solidFill>
-                      <a:prstDash val="solid"/>
-                      <a:round/>
-                      <a:headEnd type="none" w="med" len="med"/>
-                      <a:tailEnd type="none" w="med" len="med"/>
-                    </a:lnR>
-                    <a:lnT w="6350" cap="flat" cmpd="sng" algn="ctr">
-                      <a:solidFill>
-                        <a:srgbClr val="000000"/>
-                      </a:solidFill>
-                      <a:prstDash val="solid"/>
-                      <a:round/>
-                      <a:headEnd type="none" w="med" len="med"/>
-                      <a:tailEnd type="none" w="med" len="med"/>
-                    </a:lnT>
-                    <a:lnB w="6350" cap="flat" cmpd="sng" algn="ctr">
-                      <a:solidFill>
-                        <a:srgbClr val="000000"/>
-                      </a:solidFill>
-                      <a:prstDash val="solid"/>
-                      <a:round/>
-                      <a:headEnd type="none" w="med" len="med"/>
-                      <a:tailEnd type="none" w="med" len="med"/>
-                    </a:lnB>
-                    <a:solidFill>
-                      <a:schemeClr val="tx1"/>
-                    </a:solidFill>
-                  </a:tcPr>
-                </a:tc>
-                <a:extLst>
-                  <a:ext uri="{0D108BD9-81ED-4DB2-BD59-A6C34878D82A}">
-                    <a16:rowId xmlns:a16="http://schemas.microsoft.com/office/drawing/2014/main" val="2010179254"/>
-                  </a:ext>
-                </a:extLst>
-              </a:tr>
-              <a:tr h="500430">
-                <a:tc>
-                  <a:txBody>
-                    <a:bodyPr/>
-                    <a:lstStyle/>
-                    <a:p>
-                      <a:pPr algn="l" fontAlgn="b"/>
-                      <a:r>
-                        <a:rPr lang="en-US" sz="1450" b="0" i="0" u="none" strike="noStrike" dirty="0">
-                          <a:solidFill>
-                            <a:srgbClr val="000000"/>
-                          </a:solidFill>
-                          <a:effectLst/>
-                          <a:latin typeface="+mj-lt"/>
-                        </a:rPr>
-                        <a:t>Auto Sales v Gas Price</a:t>
-                      </a:r>
-                    </a:p>
-                  </a:txBody>
-                  <a:tcPr marL="8401" marR="8401" marT="8401" marB="0" anchor="b">
-                    <a:lnL w="6350" cap="flat" cmpd="sng" algn="ctr">
-                      <a:solidFill>
-                        <a:srgbClr val="000000"/>
-                      </a:solidFill>
-                      <a:prstDash val="solid"/>
-                      <a:round/>
-                      <a:headEnd type="none" w="med" len="med"/>
-                      <a:tailEnd type="none" w="med" len="med"/>
-                    </a:lnL>
-                    <a:lnR w="6350" cap="flat" cmpd="sng" algn="ctr">
-                      <a:solidFill>
-                        <a:srgbClr val="000000"/>
-                      </a:solidFill>
-                      <a:prstDash val="solid"/>
-                      <a:round/>
-                      <a:headEnd type="none" w="med" len="med"/>
-                      <a:tailEnd type="none" w="med" len="med"/>
-                    </a:lnR>
-                    <a:lnT w="6350" cap="flat" cmpd="sng" algn="ctr">
-                      <a:solidFill>
-                        <a:srgbClr val="000000"/>
-                      </a:solidFill>
-                      <a:prstDash val="solid"/>
-                      <a:round/>
-                      <a:headEnd type="none" w="med" len="med"/>
-                      <a:tailEnd type="none" w="med" len="med"/>
-                    </a:lnT>
-                    <a:lnB w="6350" cap="flat" cmpd="sng" algn="ctr">
-                      <a:solidFill>
-                        <a:srgbClr val="000000"/>
-                      </a:solidFill>
-                      <a:prstDash val="solid"/>
-                      <a:round/>
-                      <a:headEnd type="none" w="med" len="med"/>
-                      <a:tailEnd type="none" w="med" len="med"/>
-                    </a:lnB>
-                    <a:solidFill>
-                      <a:schemeClr val="tx1"/>
-                    </a:solidFill>
-                  </a:tcPr>
-                </a:tc>
-                <a:tc>
-                  <a:txBody>
-                    <a:bodyPr/>
-                    <a:lstStyle/>
-                    <a:p>
-                      <a:pPr algn="r" fontAlgn="b"/>
-                      <a:r>
-                        <a:rPr lang="en-US" sz="1450" b="0" i="0" u="none" strike="noStrike" dirty="0">
-                          <a:solidFill>
-                            <a:srgbClr val="000000"/>
-                          </a:solidFill>
-                          <a:effectLst/>
-                          <a:latin typeface="+mn-lt"/>
-                        </a:rPr>
-                        <a:t>0.000444</a:t>
-                      </a:r>
-                    </a:p>
-                  </a:txBody>
-                  <a:tcPr marL="8401" marR="8401" marT="8401" marB="0" anchor="b">
-                    <a:lnL w="6350" cap="flat" cmpd="sng" algn="ctr">
-                      <a:solidFill>
-                        <a:srgbClr val="000000"/>
-                      </a:solidFill>
-                      <a:prstDash val="solid"/>
-                      <a:round/>
-                      <a:headEnd type="none" w="med" len="med"/>
-                      <a:tailEnd type="none" w="med" len="med"/>
-                    </a:lnL>
-                    <a:lnR w="6350" cap="flat" cmpd="sng" algn="ctr">
-                      <a:solidFill>
-                        <a:srgbClr val="000000"/>
-                      </a:solidFill>
-                      <a:prstDash val="solid"/>
-                      <a:round/>
-                      <a:headEnd type="none" w="med" len="med"/>
-                      <a:tailEnd type="none" w="med" len="med"/>
-                    </a:lnR>
-                    <a:lnT w="6350" cap="flat" cmpd="sng" algn="ctr">
-                      <a:solidFill>
-                        <a:srgbClr val="000000"/>
-                      </a:solidFill>
-                      <a:prstDash val="solid"/>
-                      <a:round/>
-                      <a:headEnd type="none" w="med" len="med"/>
-                      <a:tailEnd type="none" w="med" len="med"/>
-                    </a:lnT>
-                    <a:lnB w="6350" cap="flat" cmpd="sng" algn="ctr">
-                      <a:solidFill>
-                        <a:srgbClr val="000000"/>
-                      </a:solidFill>
-                      <a:prstDash val="solid"/>
-                      <a:round/>
-                      <a:headEnd type="none" w="med" len="med"/>
-                      <a:tailEnd type="none" w="med" len="med"/>
-                    </a:lnB>
-                    <a:solidFill>
-                      <a:schemeClr val="tx1"/>
-                    </a:solidFill>
-                  </a:tcPr>
-                </a:tc>
-                <a:tc>
-                  <a:txBody>
-                    <a:bodyPr/>
-                    <a:lstStyle/>
-                    <a:p>
-                      <a:pPr algn="ctr" fontAlgn="b"/>
-                      <a:r>
-                        <a:rPr lang="en-US" sz="1450" b="0" i="0" u="none" strike="noStrike" dirty="0">
-                          <a:solidFill>
-                            <a:srgbClr val="000000"/>
-                          </a:solidFill>
-                          <a:effectLst/>
-                          <a:latin typeface="+mn-lt"/>
-                        </a:rPr>
-                        <a:t>-0.02</a:t>
-                      </a:r>
-                    </a:p>
-                  </a:txBody>
-                  <a:tcPr marL="8401" marR="8401" marT="8401" marB="0" anchor="b">
-                    <a:lnL w="6350" cap="flat" cmpd="sng" algn="ctr">
-                      <a:solidFill>
-                        <a:srgbClr val="000000"/>
-                      </a:solidFill>
-                      <a:prstDash val="solid"/>
-                      <a:round/>
-                      <a:headEnd type="none" w="med" len="med"/>
-                      <a:tailEnd type="none" w="med" len="med"/>
-                    </a:lnL>
-                    <a:lnR w="6350" cap="flat" cmpd="sng" algn="ctr">
-                      <a:solidFill>
-                        <a:srgbClr val="000000"/>
-                      </a:solidFill>
-                      <a:prstDash val="solid"/>
-                      <a:round/>
-                      <a:headEnd type="none" w="med" len="med"/>
-                      <a:tailEnd type="none" w="med" len="med"/>
-                    </a:lnR>
-                    <a:lnT w="6350" cap="flat" cmpd="sng" algn="ctr">
-                      <a:solidFill>
-                        <a:srgbClr val="000000"/>
-                      </a:solidFill>
-                      <a:prstDash val="solid"/>
-                      <a:round/>
-                      <a:headEnd type="none" w="med" len="med"/>
-                      <a:tailEnd type="none" w="med" len="med"/>
-                    </a:lnT>
-                    <a:lnB w="6350" cap="flat" cmpd="sng" algn="ctr">
-                      <a:solidFill>
-                        <a:srgbClr val="000000"/>
-                      </a:solidFill>
-                      <a:prstDash val="solid"/>
-                      <a:round/>
-                      <a:headEnd type="none" w="med" len="med"/>
-                      <a:tailEnd type="none" w="med" len="med"/>
-                    </a:lnB>
-                    <a:solidFill>
-                      <a:schemeClr val="tx1"/>
-                    </a:solidFill>
-                  </a:tcPr>
-                </a:tc>
-                <a:tc>
-                  <a:txBody>
-                    <a:bodyPr/>
-                    <a:lstStyle/>
-                    <a:p>
-                      <a:pPr algn="l" fontAlgn="b"/>
-                      <a:r>
-                        <a:rPr lang="en-US" sz="1450" b="0" i="0" u="none" strike="noStrike" dirty="0">
-                          <a:solidFill>
-                            <a:srgbClr val="000000"/>
-                          </a:solidFill>
-                          <a:effectLst/>
-                          <a:latin typeface="+mn-lt"/>
-                        </a:rPr>
-                        <a:t>Accounts for hardly any of the data: Correlation: None or very weak   </a:t>
-                      </a:r>
-                    </a:p>
-                  </a:txBody>
-                  <a:tcPr marL="8401" marR="8401" marT="8401" marB="0" anchor="b">
-                    <a:lnL w="6350" cap="flat" cmpd="sng" algn="ctr">
-                      <a:solidFill>
-                        <a:srgbClr val="000000"/>
-                      </a:solidFill>
-                      <a:prstDash val="solid"/>
-                      <a:round/>
-                      <a:headEnd type="none" w="med" len="med"/>
-                      <a:tailEnd type="none" w="med" len="med"/>
-                    </a:lnL>
-                    <a:lnR w="6350" cap="flat" cmpd="sng" algn="ctr">
-                      <a:solidFill>
-                        <a:srgbClr val="000000"/>
-                      </a:solidFill>
-                      <a:prstDash val="solid"/>
-                      <a:round/>
-                      <a:headEnd type="none" w="med" len="med"/>
-                      <a:tailEnd type="none" w="med" len="med"/>
-                    </a:lnR>
-                    <a:lnT w="6350" cap="flat" cmpd="sng" algn="ctr">
-                      <a:solidFill>
-                        <a:srgbClr val="000000"/>
-                      </a:solidFill>
-                      <a:prstDash val="solid"/>
-                      <a:round/>
-                      <a:headEnd type="none" w="med" len="med"/>
-                      <a:tailEnd type="none" w="med" len="med"/>
-                    </a:lnT>
-                    <a:lnB w="6350" cap="flat" cmpd="sng" algn="ctr">
-                      <a:solidFill>
-                        <a:srgbClr val="000000"/>
-                      </a:solidFill>
-                      <a:prstDash val="solid"/>
-                      <a:round/>
-                      <a:headEnd type="none" w="med" len="med"/>
-                      <a:tailEnd type="none" w="med" len="med"/>
-                    </a:lnB>
-                    <a:solidFill>
-                      <a:schemeClr val="tx1"/>
-                    </a:solidFill>
-                  </a:tcPr>
-                </a:tc>
-                <a:extLst>
-                  <a:ext uri="{0D108BD9-81ED-4DB2-BD59-A6C34878D82A}">
-                    <a16:rowId xmlns:a16="http://schemas.microsoft.com/office/drawing/2014/main" val="2427005476"/>
-                  </a:ext>
-                </a:extLst>
-              </a:tr>
-              <a:tr h="500430">
-                <a:tc>
-                  <a:txBody>
-                    <a:bodyPr/>
-                    <a:lstStyle/>
-                    <a:p>
-                      <a:pPr algn="l" fontAlgn="b"/>
-                      <a:r>
-                        <a:rPr lang="en-US" sz="1450" b="0" i="0" u="none" strike="noStrike" dirty="0">
-                          <a:solidFill>
-                            <a:srgbClr val="000000"/>
-                          </a:solidFill>
-                          <a:effectLst/>
-                          <a:latin typeface="+mj-lt"/>
-                        </a:rPr>
-                        <a:t>Auto Sales v Unemployment</a:t>
-                      </a:r>
-                    </a:p>
-                  </a:txBody>
-                  <a:tcPr marL="8401" marR="8401" marT="8401" marB="0" anchor="b">
-                    <a:lnL w="6350" cap="flat" cmpd="sng" algn="ctr">
-                      <a:solidFill>
-                        <a:srgbClr val="000000"/>
-                      </a:solidFill>
-                      <a:prstDash val="solid"/>
-                      <a:round/>
-                      <a:headEnd type="none" w="med" len="med"/>
-                      <a:tailEnd type="none" w="med" len="med"/>
-                    </a:lnL>
-                    <a:lnR w="6350" cap="flat" cmpd="sng" algn="ctr">
-                      <a:solidFill>
-                        <a:srgbClr val="000000"/>
-                      </a:solidFill>
-                      <a:prstDash val="solid"/>
-                      <a:round/>
-                      <a:headEnd type="none" w="med" len="med"/>
-                      <a:tailEnd type="none" w="med" len="med"/>
-                    </a:lnR>
-                    <a:lnT w="6350" cap="flat" cmpd="sng" algn="ctr">
-                      <a:solidFill>
-                        <a:srgbClr val="000000"/>
-                      </a:solidFill>
-                      <a:prstDash val="solid"/>
-                      <a:round/>
-                      <a:headEnd type="none" w="med" len="med"/>
-                      <a:tailEnd type="none" w="med" len="med"/>
-                    </a:lnT>
-                    <a:lnB w="6350" cap="flat" cmpd="sng" algn="ctr">
-                      <a:solidFill>
-                        <a:srgbClr val="000000"/>
-                      </a:solidFill>
-                      <a:prstDash val="solid"/>
-                      <a:round/>
-                      <a:headEnd type="none" w="med" len="med"/>
-                      <a:tailEnd type="none" w="med" len="med"/>
-                    </a:lnB>
-                    <a:solidFill>
-                      <a:schemeClr val="tx1"/>
-                    </a:solidFill>
-                  </a:tcPr>
-                </a:tc>
-                <a:tc>
-                  <a:txBody>
-                    <a:bodyPr/>
-                    <a:lstStyle/>
-                    <a:p>
-                      <a:pPr algn="r" fontAlgn="b"/>
-                      <a:r>
-                        <a:rPr lang="en-US" sz="1450" b="0" i="0" u="none" strike="noStrike" dirty="0">
-                          <a:solidFill>
-                            <a:srgbClr val="000000"/>
-                          </a:solidFill>
-                          <a:effectLst/>
-                          <a:latin typeface="+mn-lt"/>
-                        </a:rPr>
-                        <a:t>0.378681</a:t>
-                      </a:r>
-                    </a:p>
-                  </a:txBody>
-                  <a:tcPr marL="8401" marR="8401" marT="8401" marB="0" anchor="b">
-                    <a:lnL w="6350" cap="flat" cmpd="sng" algn="ctr">
-                      <a:solidFill>
-                        <a:srgbClr val="000000"/>
-                      </a:solidFill>
-                      <a:prstDash val="solid"/>
-                      <a:round/>
-                      <a:headEnd type="none" w="med" len="med"/>
-                      <a:tailEnd type="none" w="med" len="med"/>
-                    </a:lnL>
-                    <a:lnR w="6350" cap="flat" cmpd="sng" algn="ctr">
-                      <a:solidFill>
-                        <a:srgbClr val="000000"/>
-                      </a:solidFill>
-                      <a:prstDash val="solid"/>
-                      <a:round/>
-                      <a:headEnd type="none" w="med" len="med"/>
-                      <a:tailEnd type="none" w="med" len="med"/>
-                    </a:lnR>
-                    <a:lnT w="6350" cap="flat" cmpd="sng" algn="ctr">
-                      <a:solidFill>
-                        <a:srgbClr val="000000"/>
-                      </a:solidFill>
-                      <a:prstDash val="solid"/>
-                      <a:round/>
-                      <a:headEnd type="none" w="med" len="med"/>
-                      <a:tailEnd type="none" w="med" len="med"/>
-                    </a:lnT>
-                    <a:lnB w="6350" cap="flat" cmpd="sng" algn="ctr">
-                      <a:solidFill>
-                        <a:srgbClr val="000000"/>
-                      </a:solidFill>
-                      <a:prstDash val="solid"/>
-                      <a:round/>
-                      <a:headEnd type="none" w="med" len="med"/>
-                      <a:tailEnd type="none" w="med" len="med"/>
-                    </a:lnB>
-                    <a:solidFill>
-                      <a:schemeClr val="tx1"/>
-                    </a:solidFill>
-                  </a:tcPr>
-                </a:tc>
-                <a:tc>
-                  <a:txBody>
-                    <a:bodyPr/>
-                    <a:lstStyle/>
-                    <a:p>
-                      <a:pPr algn="ctr" fontAlgn="b"/>
-                      <a:r>
-                        <a:rPr lang="en-US" sz="1450" b="0" i="0" u="none" strike="noStrike" dirty="0">
-                          <a:solidFill>
-                            <a:srgbClr val="000000"/>
-                          </a:solidFill>
-                          <a:effectLst/>
-                          <a:latin typeface="+mn-lt"/>
-                        </a:rPr>
-                        <a:t>-0.62</a:t>
-                      </a:r>
-                    </a:p>
-                  </a:txBody>
-                  <a:tcPr marL="8401" marR="8401" marT="8401" marB="0" anchor="b">
-                    <a:lnL w="6350" cap="flat" cmpd="sng" algn="ctr">
-                      <a:solidFill>
-                        <a:srgbClr val="000000"/>
-                      </a:solidFill>
-                      <a:prstDash val="solid"/>
-                      <a:round/>
-                      <a:headEnd type="none" w="med" len="med"/>
-                      <a:tailEnd type="none" w="med" len="med"/>
-                    </a:lnL>
-                    <a:lnR w="6350" cap="flat" cmpd="sng" algn="ctr">
-                      <a:solidFill>
-                        <a:srgbClr val="000000"/>
-                      </a:solidFill>
-                      <a:prstDash val="solid"/>
-                      <a:round/>
-                      <a:headEnd type="none" w="med" len="med"/>
-                      <a:tailEnd type="none" w="med" len="med"/>
-                    </a:lnR>
-                    <a:lnT w="6350" cap="flat" cmpd="sng" algn="ctr">
-                      <a:solidFill>
-                        <a:srgbClr val="000000"/>
-                      </a:solidFill>
-                      <a:prstDash val="solid"/>
-                      <a:round/>
-                      <a:headEnd type="none" w="med" len="med"/>
-                      <a:tailEnd type="none" w="med" len="med"/>
-                    </a:lnT>
-                    <a:lnB w="6350" cap="flat" cmpd="sng" algn="ctr">
-                      <a:solidFill>
-                        <a:srgbClr val="000000"/>
-                      </a:solidFill>
-                      <a:prstDash val="solid"/>
-                      <a:round/>
-                      <a:headEnd type="none" w="med" len="med"/>
-                      <a:tailEnd type="none" w="med" len="med"/>
-                    </a:lnB>
-                    <a:solidFill>
-                      <a:schemeClr val="tx1"/>
-                    </a:solidFill>
-                  </a:tcPr>
-                </a:tc>
-                <a:tc>
-                  <a:txBody>
-                    <a:bodyPr/>
-                    <a:lstStyle/>
-                    <a:p>
-                      <a:pPr algn="l" fontAlgn="b"/>
-                      <a:r>
-                        <a:rPr lang="en-US" sz="1450" b="0" i="0" u="none" strike="noStrike" dirty="0">
-                          <a:solidFill>
-                            <a:srgbClr val="000000"/>
-                          </a:solidFill>
-                          <a:effectLst/>
-                          <a:latin typeface="+mn-lt"/>
-                        </a:rPr>
-                        <a:t>Accounts for roughly 38% of the data: Correlation: Moderate</a:t>
-                      </a:r>
-                    </a:p>
-                  </a:txBody>
-                  <a:tcPr marL="8401" marR="8401" marT="8401" marB="0" anchor="b">
-                    <a:lnL w="6350" cap="flat" cmpd="sng" algn="ctr">
-                      <a:solidFill>
-                        <a:srgbClr val="000000"/>
-                      </a:solidFill>
-                      <a:prstDash val="solid"/>
-                      <a:round/>
-                      <a:headEnd type="none" w="med" len="med"/>
-                      <a:tailEnd type="none" w="med" len="med"/>
-                    </a:lnL>
-                    <a:lnR w="6350" cap="flat" cmpd="sng" algn="ctr">
-                      <a:solidFill>
-                        <a:srgbClr val="000000"/>
-                      </a:solidFill>
-                      <a:prstDash val="solid"/>
-                      <a:round/>
-                      <a:headEnd type="none" w="med" len="med"/>
-                      <a:tailEnd type="none" w="med" len="med"/>
-                    </a:lnR>
-                    <a:lnT w="6350" cap="flat" cmpd="sng" algn="ctr">
-                      <a:solidFill>
-                        <a:srgbClr val="000000"/>
-                      </a:solidFill>
-                      <a:prstDash val="solid"/>
-                      <a:round/>
-                      <a:headEnd type="none" w="med" len="med"/>
-                      <a:tailEnd type="none" w="med" len="med"/>
-                    </a:lnT>
-                    <a:lnB w="6350" cap="flat" cmpd="sng" algn="ctr">
-                      <a:solidFill>
-                        <a:srgbClr val="000000"/>
-                      </a:solidFill>
-                      <a:prstDash val="solid"/>
-                      <a:round/>
-                      <a:headEnd type="none" w="med" len="med"/>
-                      <a:tailEnd type="none" w="med" len="med"/>
-                    </a:lnB>
-                    <a:solidFill>
-                      <a:schemeClr val="tx1"/>
-                    </a:solidFill>
-                  </a:tcPr>
-                </a:tc>
-                <a:extLst>
-                  <a:ext uri="{0D108BD9-81ED-4DB2-BD59-A6C34878D82A}">
-                    <a16:rowId xmlns:a16="http://schemas.microsoft.com/office/drawing/2014/main" val="132925298"/>
-                  </a:ext>
-                </a:extLst>
-              </a:tr>
-              <a:tr h="500430">
-                <a:tc>
-                  <a:txBody>
-                    <a:bodyPr/>
-                    <a:lstStyle/>
-                    <a:p>
-                      <a:pPr algn="l" fontAlgn="b"/>
-                      <a:r>
-                        <a:rPr lang="en-US" sz="1450" b="0" i="0" u="none" strike="noStrike" dirty="0">
-                          <a:solidFill>
-                            <a:srgbClr val="000000"/>
-                          </a:solidFill>
-                          <a:effectLst/>
-                          <a:latin typeface="+mj-lt"/>
-                        </a:rPr>
-                        <a:t>Auto Sales v Steel Price Index</a:t>
-                      </a:r>
-                    </a:p>
-                  </a:txBody>
-                  <a:tcPr marL="8401" marR="8401" marT="8401" marB="0" anchor="b">
-                    <a:lnL w="6350" cap="flat" cmpd="sng" algn="ctr">
-                      <a:solidFill>
-                        <a:srgbClr val="000000"/>
-                      </a:solidFill>
-                      <a:prstDash val="solid"/>
-                      <a:round/>
-                      <a:headEnd type="none" w="med" len="med"/>
-                      <a:tailEnd type="none" w="med" len="med"/>
-                    </a:lnL>
-                    <a:lnR w="6350" cap="flat" cmpd="sng" algn="ctr">
-                      <a:solidFill>
-                        <a:srgbClr val="000000"/>
-                      </a:solidFill>
-                      <a:prstDash val="solid"/>
-                      <a:round/>
-                      <a:headEnd type="none" w="med" len="med"/>
-                      <a:tailEnd type="none" w="med" len="med"/>
-                    </a:lnR>
-                    <a:lnT w="6350" cap="flat" cmpd="sng" algn="ctr">
-                      <a:solidFill>
-                        <a:srgbClr val="000000"/>
-                      </a:solidFill>
-                      <a:prstDash val="solid"/>
-                      <a:round/>
-                      <a:headEnd type="none" w="med" len="med"/>
-                      <a:tailEnd type="none" w="med" len="med"/>
-                    </a:lnT>
-                    <a:lnB w="6350" cap="flat" cmpd="sng" algn="ctr">
-                      <a:solidFill>
-                        <a:srgbClr val="000000"/>
-                      </a:solidFill>
-                      <a:prstDash val="solid"/>
-                      <a:round/>
-                      <a:headEnd type="none" w="med" len="med"/>
-                      <a:tailEnd type="none" w="med" len="med"/>
-                    </a:lnB>
-                    <a:solidFill>
-                      <a:schemeClr val="tx1"/>
-                    </a:solidFill>
-                  </a:tcPr>
-                </a:tc>
-                <a:tc>
-                  <a:txBody>
-                    <a:bodyPr/>
-                    <a:lstStyle/>
-                    <a:p>
-                      <a:pPr algn="r" fontAlgn="b"/>
-                      <a:r>
-                        <a:rPr lang="en-US" sz="1450" b="0" i="0" u="none" strike="noStrike" dirty="0">
-                          <a:solidFill>
-                            <a:srgbClr val="000000"/>
-                          </a:solidFill>
-                          <a:effectLst/>
-                          <a:latin typeface="+mn-lt"/>
-                        </a:rPr>
-                        <a:t>0.000751</a:t>
-                      </a:r>
-                    </a:p>
-                  </a:txBody>
-                  <a:tcPr marL="8401" marR="8401" marT="8401" marB="0" anchor="b">
-                    <a:lnL w="6350" cap="flat" cmpd="sng" algn="ctr">
-                      <a:solidFill>
-                        <a:srgbClr val="000000"/>
-                      </a:solidFill>
-                      <a:prstDash val="solid"/>
-                      <a:round/>
-                      <a:headEnd type="none" w="med" len="med"/>
-                      <a:tailEnd type="none" w="med" len="med"/>
-                    </a:lnL>
-                    <a:lnR w="6350" cap="flat" cmpd="sng" algn="ctr">
-                      <a:solidFill>
-                        <a:srgbClr val="000000"/>
-                      </a:solidFill>
-                      <a:prstDash val="solid"/>
-                      <a:round/>
-                      <a:headEnd type="none" w="med" len="med"/>
-                      <a:tailEnd type="none" w="med" len="med"/>
-                    </a:lnR>
-                    <a:lnT w="6350" cap="flat" cmpd="sng" algn="ctr">
-                      <a:solidFill>
-                        <a:srgbClr val="000000"/>
-                      </a:solidFill>
-                      <a:prstDash val="solid"/>
-                      <a:round/>
-                      <a:headEnd type="none" w="med" len="med"/>
-                      <a:tailEnd type="none" w="med" len="med"/>
-                    </a:lnT>
-                    <a:lnB w="6350" cap="flat" cmpd="sng" algn="ctr">
-                      <a:solidFill>
-                        <a:srgbClr val="000000"/>
-                      </a:solidFill>
-                      <a:prstDash val="solid"/>
-                      <a:round/>
-                      <a:headEnd type="none" w="med" len="med"/>
-                      <a:tailEnd type="none" w="med" len="med"/>
-                    </a:lnB>
-                    <a:solidFill>
-                      <a:schemeClr val="tx1"/>
-                    </a:solidFill>
-                  </a:tcPr>
-                </a:tc>
-                <a:tc>
-                  <a:txBody>
-                    <a:bodyPr/>
-                    <a:lstStyle/>
-                    <a:p>
-                      <a:pPr algn="ctr" fontAlgn="b"/>
-                      <a:r>
-                        <a:rPr lang="en-US" sz="1450" b="0" i="0" u="none" strike="noStrike" dirty="0">
-                          <a:solidFill>
-                            <a:srgbClr val="000000"/>
-                          </a:solidFill>
-                          <a:effectLst/>
-                          <a:latin typeface="+mn-lt"/>
-                        </a:rPr>
-                        <a:t>-0.03</a:t>
-                      </a:r>
-                    </a:p>
-                  </a:txBody>
-                  <a:tcPr marL="8401" marR="8401" marT="8401" marB="0" anchor="b">
-                    <a:lnL w="6350" cap="flat" cmpd="sng" algn="ctr">
-                      <a:solidFill>
-                        <a:srgbClr val="000000"/>
-                      </a:solidFill>
-                      <a:prstDash val="solid"/>
-                      <a:round/>
-                      <a:headEnd type="none" w="med" len="med"/>
-                      <a:tailEnd type="none" w="med" len="med"/>
-                    </a:lnL>
-                    <a:lnR w="6350" cap="flat" cmpd="sng" algn="ctr">
-                      <a:solidFill>
-                        <a:srgbClr val="000000"/>
-                      </a:solidFill>
-                      <a:prstDash val="solid"/>
-                      <a:round/>
-                      <a:headEnd type="none" w="med" len="med"/>
-                      <a:tailEnd type="none" w="med" len="med"/>
-                    </a:lnR>
-                    <a:lnT w="6350" cap="flat" cmpd="sng" algn="ctr">
-                      <a:solidFill>
-                        <a:srgbClr val="000000"/>
-                      </a:solidFill>
-                      <a:prstDash val="solid"/>
-                      <a:round/>
-                      <a:headEnd type="none" w="med" len="med"/>
-                      <a:tailEnd type="none" w="med" len="med"/>
-                    </a:lnT>
-                    <a:lnB w="6350" cap="flat" cmpd="sng" algn="ctr">
-                      <a:solidFill>
-                        <a:srgbClr val="000000"/>
-                      </a:solidFill>
-                      <a:prstDash val="solid"/>
-                      <a:round/>
-                      <a:headEnd type="none" w="med" len="med"/>
-                      <a:tailEnd type="none" w="med" len="med"/>
-                    </a:lnB>
-                    <a:solidFill>
-                      <a:schemeClr val="tx1"/>
-                    </a:solidFill>
-                  </a:tcPr>
-                </a:tc>
-                <a:tc>
-                  <a:txBody>
-                    <a:bodyPr/>
-                    <a:lstStyle/>
-                    <a:p>
-                      <a:pPr algn="l" fontAlgn="b"/>
-                      <a:r>
-                        <a:rPr lang="en-US" sz="1450" b="0" i="0" u="none" strike="noStrike" dirty="0">
-                          <a:solidFill>
-                            <a:srgbClr val="000000"/>
-                          </a:solidFill>
-                          <a:effectLst/>
-                          <a:latin typeface="+mn-lt"/>
-                        </a:rPr>
-                        <a:t>Accounts for hardly any of the data: Correlation: None, or very Weak</a:t>
-                      </a:r>
-                    </a:p>
-                  </a:txBody>
-                  <a:tcPr marL="8401" marR="8401" marT="8401" marB="0" anchor="b">
-                    <a:lnL w="6350" cap="flat" cmpd="sng" algn="ctr">
-                      <a:solidFill>
-                        <a:srgbClr val="000000"/>
-                      </a:solidFill>
-                      <a:prstDash val="solid"/>
-                      <a:round/>
-                      <a:headEnd type="none" w="med" len="med"/>
-                      <a:tailEnd type="none" w="med" len="med"/>
-                    </a:lnL>
-                    <a:lnR w="6350" cap="flat" cmpd="sng" algn="ctr">
-                      <a:solidFill>
-                        <a:srgbClr val="000000"/>
-                      </a:solidFill>
-                      <a:prstDash val="solid"/>
-                      <a:round/>
-                      <a:headEnd type="none" w="med" len="med"/>
-                      <a:tailEnd type="none" w="med" len="med"/>
-                    </a:lnR>
-                    <a:lnT w="6350" cap="flat" cmpd="sng" algn="ctr">
-                      <a:solidFill>
-                        <a:srgbClr val="000000"/>
-                      </a:solidFill>
-                      <a:prstDash val="solid"/>
-                      <a:round/>
-                      <a:headEnd type="none" w="med" len="med"/>
-                      <a:tailEnd type="none" w="med" len="med"/>
-                    </a:lnT>
-                    <a:lnB w="6350" cap="flat" cmpd="sng" algn="ctr">
-                      <a:solidFill>
-                        <a:srgbClr val="000000"/>
-                      </a:solidFill>
-                      <a:prstDash val="solid"/>
-                      <a:round/>
-                      <a:headEnd type="none" w="med" len="med"/>
-                      <a:tailEnd type="none" w="med" len="med"/>
-                    </a:lnB>
-                    <a:solidFill>
-                      <a:schemeClr val="tx1"/>
-                    </a:solidFill>
-                  </a:tcPr>
-                </a:tc>
-                <a:extLst>
-                  <a:ext uri="{0D108BD9-81ED-4DB2-BD59-A6C34878D82A}">
-                    <a16:rowId xmlns:a16="http://schemas.microsoft.com/office/drawing/2014/main" val="866663325"/>
-                  </a:ext>
-                </a:extLst>
-              </a:tr>
-              <a:tr h="500430">
-                <a:tc>
-                  <a:txBody>
-                    <a:bodyPr/>
-                    <a:lstStyle/>
-                    <a:p>
-                      <a:pPr algn="l" fontAlgn="b"/>
-                      <a:r>
-                        <a:rPr lang="en-US" sz="1450" b="0" i="0" u="none" strike="noStrike" dirty="0">
-                          <a:solidFill>
-                            <a:srgbClr val="000000"/>
-                          </a:solidFill>
-                          <a:effectLst/>
-                          <a:latin typeface="+mj-lt"/>
-                        </a:rPr>
-                        <a:t>Auto Sales v New Vehicle Price Index</a:t>
-                      </a:r>
-                    </a:p>
-                  </a:txBody>
-                  <a:tcPr marL="8401" marR="8401" marT="8401" marB="0" anchor="b">
-                    <a:lnL w="6350" cap="flat" cmpd="sng" algn="ctr">
-                      <a:solidFill>
-                        <a:srgbClr val="000000"/>
-                      </a:solidFill>
-                      <a:prstDash val="solid"/>
-                      <a:round/>
-                      <a:headEnd type="none" w="med" len="med"/>
-                      <a:tailEnd type="none" w="med" len="med"/>
-                    </a:lnL>
-                    <a:lnR w="6350" cap="flat" cmpd="sng" algn="ctr">
-                      <a:solidFill>
-                        <a:srgbClr val="000000"/>
-                      </a:solidFill>
-                      <a:prstDash val="solid"/>
-                      <a:round/>
-                      <a:headEnd type="none" w="med" len="med"/>
-                      <a:tailEnd type="none" w="med" len="med"/>
-                    </a:lnR>
-                    <a:lnT w="6350" cap="flat" cmpd="sng" algn="ctr">
-                      <a:solidFill>
-                        <a:srgbClr val="000000"/>
-                      </a:solidFill>
-                      <a:prstDash val="solid"/>
-                      <a:round/>
-                      <a:headEnd type="none" w="med" len="med"/>
-                      <a:tailEnd type="none" w="med" len="med"/>
-                    </a:lnT>
-                    <a:lnB w="6350" cap="flat" cmpd="sng" algn="ctr">
-                      <a:solidFill>
-                        <a:srgbClr val="000000"/>
-                      </a:solidFill>
-                      <a:prstDash val="solid"/>
-                      <a:round/>
-                      <a:headEnd type="none" w="med" len="med"/>
-                      <a:tailEnd type="none" w="med" len="med"/>
-                    </a:lnB>
-                    <a:solidFill>
-                      <a:schemeClr val="tx1"/>
-                    </a:solidFill>
-                  </a:tcPr>
-                </a:tc>
-                <a:tc>
-                  <a:txBody>
-                    <a:bodyPr/>
-                    <a:lstStyle/>
-                    <a:p>
-                      <a:pPr algn="r" fontAlgn="b"/>
-                      <a:r>
-                        <a:rPr lang="en-US" sz="1450" b="0" i="0" u="none" strike="noStrike" dirty="0">
-                          <a:solidFill>
-                            <a:srgbClr val="000000"/>
-                          </a:solidFill>
-                          <a:effectLst/>
-                          <a:latin typeface="+mn-lt"/>
-                        </a:rPr>
-                        <a:t>0.204739</a:t>
-                      </a:r>
-                    </a:p>
-                  </a:txBody>
-                  <a:tcPr marL="8401" marR="8401" marT="8401" marB="0" anchor="b">
-                    <a:lnL w="6350" cap="flat" cmpd="sng" algn="ctr">
-                      <a:solidFill>
-                        <a:srgbClr val="000000"/>
-                      </a:solidFill>
-                      <a:prstDash val="solid"/>
-                      <a:round/>
-                      <a:headEnd type="none" w="med" len="med"/>
-                      <a:tailEnd type="none" w="med" len="med"/>
-                    </a:lnL>
-                    <a:lnR w="6350" cap="flat" cmpd="sng" algn="ctr">
-                      <a:solidFill>
-                        <a:srgbClr val="000000"/>
-                      </a:solidFill>
-                      <a:prstDash val="solid"/>
-                      <a:round/>
-                      <a:headEnd type="none" w="med" len="med"/>
-                      <a:tailEnd type="none" w="med" len="med"/>
-                    </a:lnR>
-                    <a:lnT w="6350" cap="flat" cmpd="sng" algn="ctr">
-                      <a:solidFill>
-                        <a:srgbClr val="000000"/>
-                      </a:solidFill>
-                      <a:prstDash val="solid"/>
-                      <a:round/>
-                      <a:headEnd type="none" w="med" len="med"/>
-                      <a:tailEnd type="none" w="med" len="med"/>
-                    </a:lnT>
-                    <a:lnB w="6350" cap="flat" cmpd="sng" algn="ctr">
-                      <a:solidFill>
-                        <a:srgbClr val="000000"/>
-                      </a:solidFill>
-                      <a:prstDash val="solid"/>
-                      <a:round/>
-                      <a:headEnd type="none" w="med" len="med"/>
-                      <a:tailEnd type="none" w="med" len="med"/>
-                    </a:lnB>
-                    <a:solidFill>
-                      <a:schemeClr val="tx1"/>
-                    </a:solidFill>
-                  </a:tcPr>
-                </a:tc>
-                <a:tc>
-                  <a:txBody>
-                    <a:bodyPr/>
-                    <a:lstStyle/>
-                    <a:p>
-                      <a:pPr algn="ctr" fontAlgn="b"/>
-                      <a:r>
-                        <a:rPr lang="en-US" sz="1450" b="0" i="0" u="none" strike="noStrike" dirty="0">
-                          <a:solidFill>
-                            <a:srgbClr val="000000"/>
-                          </a:solidFill>
-                          <a:effectLst/>
-                          <a:latin typeface="+mn-lt"/>
-                        </a:rPr>
-                        <a:t>0.45</a:t>
-                      </a:r>
-                    </a:p>
-                  </a:txBody>
-                  <a:tcPr marL="8401" marR="8401" marT="8401" marB="0" anchor="b">
-                    <a:lnL w="6350" cap="flat" cmpd="sng" algn="ctr">
-                      <a:solidFill>
-                        <a:srgbClr val="000000"/>
-                      </a:solidFill>
-                      <a:prstDash val="solid"/>
-                      <a:round/>
-                      <a:headEnd type="none" w="med" len="med"/>
-                      <a:tailEnd type="none" w="med" len="med"/>
-                    </a:lnL>
-                    <a:lnR w="6350" cap="flat" cmpd="sng" algn="ctr">
-                      <a:solidFill>
-                        <a:srgbClr val="000000"/>
-                      </a:solidFill>
-                      <a:prstDash val="solid"/>
-                      <a:round/>
-                      <a:headEnd type="none" w="med" len="med"/>
-                      <a:tailEnd type="none" w="med" len="med"/>
-                    </a:lnR>
-                    <a:lnT w="6350" cap="flat" cmpd="sng" algn="ctr">
-                      <a:solidFill>
-                        <a:srgbClr val="000000"/>
-                      </a:solidFill>
-                      <a:prstDash val="solid"/>
-                      <a:round/>
-                      <a:headEnd type="none" w="med" len="med"/>
-                      <a:tailEnd type="none" w="med" len="med"/>
-                    </a:lnT>
-                    <a:lnB w="6350" cap="flat" cmpd="sng" algn="ctr">
-                      <a:solidFill>
-                        <a:srgbClr val="000000"/>
-                      </a:solidFill>
-                      <a:prstDash val="solid"/>
-                      <a:round/>
-                      <a:headEnd type="none" w="med" len="med"/>
-                      <a:tailEnd type="none" w="med" len="med"/>
-                    </a:lnB>
-                    <a:solidFill>
-                      <a:schemeClr val="tx1"/>
-                    </a:solidFill>
-                  </a:tcPr>
-                </a:tc>
-                <a:tc>
-                  <a:txBody>
-                    <a:bodyPr/>
-                    <a:lstStyle/>
-                    <a:p>
-                      <a:pPr algn="l" fontAlgn="b"/>
-                      <a:r>
-                        <a:rPr lang="en-US" sz="1450" b="0" i="0" u="none" strike="noStrike" dirty="0">
-                          <a:solidFill>
-                            <a:srgbClr val="000000"/>
-                          </a:solidFill>
-                          <a:effectLst/>
-                          <a:latin typeface="+mn-lt"/>
-                        </a:rPr>
-                        <a:t>Accounts for roughly 20% of the data: Correlation: Weak</a:t>
-                      </a:r>
-                    </a:p>
-                  </a:txBody>
-                  <a:tcPr marL="8401" marR="8401" marT="8401" marB="0" anchor="b">
-                    <a:lnL w="6350" cap="flat" cmpd="sng" algn="ctr">
-                      <a:solidFill>
-                        <a:srgbClr val="000000"/>
-                      </a:solidFill>
-                      <a:prstDash val="solid"/>
-                      <a:round/>
-                      <a:headEnd type="none" w="med" len="med"/>
-                      <a:tailEnd type="none" w="med" len="med"/>
-                    </a:lnL>
-                    <a:lnR w="6350" cap="flat" cmpd="sng" algn="ctr">
-                      <a:solidFill>
-                        <a:srgbClr val="000000"/>
-                      </a:solidFill>
-                      <a:prstDash val="solid"/>
-                      <a:round/>
-                      <a:headEnd type="none" w="med" len="med"/>
-                      <a:tailEnd type="none" w="med" len="med"/>
-                    </a:lnR>
-                    <a:lnT w="6350" cap="flat" cmpd="sng" algn="ctr">
-                      <a:solidFill>
-                        <a:srgbClr val="000000"/>
-                      </a:solidFill>
-                      <a:prstDash val="solid"/>
-                      <a:round/>
-                      <a:headEnd type="none" w="med" len="med"/>
-                      <a:tailEnd type="none" w="med" len="med"/>
-                    </a:lnT>
-                    <a:lnB w="6350" cap="flat" cmpd="sng" algn="ctr">
-                      <a:solidFill>
-                        <a:srgbClr val="000000"/>
-                      </a:solidFill>
-                      <a:prstDash val="solid"/>
-                      <a:round/>
-                      <a:headEnd type="none" w="med" len="med"/>
-                      <a:tailEnd type="none" w="med" len="med"/>
-                    </a:lnB>
-                    <a:solidFill>
-                      <a:schemeClr val="tx1"/>
-                    </a:solidFill>
-                  </a:tcPr>
-                </a:tc>
-                <a:extLst>
-                  <a:ext uri="{0D108BD9-81ED-4DB2-BD59-A6C34878D82A}">
-                    <a16:rowId xmlns:a16="http://schemas.microsoft.com/office/drawing/2014/main" val="3753190026"/>
-                  </a:ext>
-                </a:extLst>
-              </a:tr>
-              <a:tr h="500430">
-                <a:tc>
-                  <a:txBody>
-                    <a:bodyPr/>
-                    <a:lstStyle/>
-                    <a:p>
-                      <a:pPr algn="l" fontAlgn="b"/>
-                      <a:r>
-                        <a:rPr lang="en-US" sz="1450" b="0" i="0" u="none" strike="noStrike" dirty="0">
-                          <a:solidFill>
-                            <a:srgbClr val="000000"/>
-                          </a:solidFill>
-                          <a:effectLst/>
-                          <a:latin typeface="+mj-lt"/>
-                        </a:rPr>
-                        <a:t>Auto Sales v Used Vehicle Price Index</a:t>
-                      </a:r>
-                    </a:p>
-                  </a:txBody>
-                  <a:tcPr marL="8401" marR="8401" marT="8401" marB="0" anchor="b">
-                    <a:lnL w="6350" cap="flat" cmpd="sng" algn="ctr">
-                      <a:solidFill>
-                        <a:srgbClr val="000000"/>
-                      </a:solidFill>
-                      <a:prstDash val="solid"/>
-                      <a:round/>
-                      <a:headEnd type="none" w="med" len="med"/>
-                      <a:tailEnd type="none" w="med" len="med"/>
-                    </a:lnL>
-                    <a:lnR w="6350" cap="flat" cmpd="sng" algn="ctr">
-                      <a:solidFill>
-                        <a:srgbClr val="000000"/>
-                      </a:solidFill>
-                      <a:prstDash val="solid"/>
-                      <a:round/>
-                      <a:headEnd type="none" w="med" len="med"/>
-                      <a:tailEnd type="none" w="med" len="med"/>
-                    </a:lnR>
-                    <a:lnT w="6350" cap="flat" cmpd="sng" algn="ctr">
-                      <a:solidFill>
-                        <a:srgbClr val="000000"/>
-                      </a:solidFill>
-                      <a:prstDash val="solid"/>
-                      <a:round/>
-                      <a:headEnd type="none" w="med" len="med"/>
-                      <a:tailEnd type="none" w="med" len="med"/>
-                    </a:lnT>
-                    <a:lnB w="6350" cap="flat" cmpd="sng" algn="ctr">
-                      <a:solidFill>
-                        <a:srgbClr val="000000"/>
-                      </a:solidFill>
-                      <a:prstDash val="solid"/>
-                      <a:round/>
-                      <a:headEnd type="none" w="med" len="med"/>
-                      <a:tailEnd type="none" w="med" len="med"/>
-                    </a:lnB>
-                    <a:solidFill>
-                      <a:schemeClr val="tx1"/>
-                    </a:solidFill>
-                  </a:tcPr>
-                </a:tc>
-                <a:tc>
-                  <a:txBody>
-                    <a:bodyPr/>
-                    <a:lstStyle/>
-                    <a:p>
-                      <a:pPr algn="r" fontAlgn="b"/>
-                      <a:r>
-                        <a:rPr lang="en-US" sz="1450" b="0" i="0" u="none" strike="noStrike" dirty="0">
-                          <a:solidFill>
-                            <a:srgbClr val="000000"/>
-                          </a:solidFill>
-                          <a:effectLst/>
-                          <a:latin typeface="+mn-lt"/>
-                        </a:rPr>
-                        <a:t>0.055362</a:t>
-                      </a:r>
-                    </a:p>
-                  </a:txBody>
-                  <a:tcPr marL="8401" marR="8401" marT="8401" marB="0" anchor="b">
-                    <a:lnL w="6350" cap="flat" cmpd="sng" algn="ctr">
-                      <a:solidFill>
-                        <a:srgbClr val="000000"/>
-                      </a:solidFill>
-                      <a:prstDash val="solid"/>
-                      <a:round/>
-                      <a:headEnd type="none" w="med" len="med"/>
-                      <a:tailEnd type="none" w="med" len="med"/>
-                    </a:lnL>
-                    <a:lnR w="6350" cap="flat" cmpd="sng" algn="ctr">
-                      <a:solidFill>
-                        <a:srgbClr val="000000"/>
-                      </a:solidFill>
-                      <a:prstDash val="solid"/>
-                      <a:round/>
-                      <a:headEnd type="none" w="med" len="med"/>
-                      <a:tailEnd type="none" w="med" len="med"/>
-                    </a:lnR>
-                    <a:lnT w="6350" cap="flat" cmpd="sng" algn="ctr">
-                      <a:solidFill>
-                        <a:srgbClr val="000000"/>
-                      </a:solidFill>
-                      <a:prstDash val="solid"/>
-                      <a:round/>
-                      <a:headEnd type="none" w="med" len="med"/>
-                      <a:tailEnd type="none" w="med" len="med"/>
-                    </a:lnT>
-                    <a:lnB w="6350" cap="flat" cmpd="sng" algn="ctr">
-                      <a:solidFill>
-                        <a:srgbClr val="000000"/>
-                      </a:solidFill>
-                      <a:prstDash val="solid"/>
-                      <a:round/>
-                      <a:headEnd type="none" w="med" len="med"/>
-                      <a:tailEnd type="none" w="med" len="med"/>
-                    </a:lnB>
-                    <a:solidFill>
-                      <a:schemeClr val="tx1"/>
-                    </a:solidFill>
-                  </a:tcPr>
-                </a:tc>
-                <a:tc>
-                  <a:txBody>
-                    <a:bodyPr/>
-                    <a:lstStyle/>
-                    <a:p>
-                      <a:pPr algn="ctr" fontAlgn="b"/>
-                      <a:r>
-                        <a:rPr lang="en-US" sz="1450" b="0" i="0" u="none" strike="noStrike" dirty="0">
-                          <a:solidFill>
-                            <a:srgbClr val="000000"/>
-                          </a:solidFill>
-                          <a:effectLst/>
-                          <a:latin typeface="+mn-lt"/>
-                        </a:rPr>
-                        <a:t>0.24</a:t>
-                      </a:r>
-                    </a:p>
-                  </a:txBody>
-                  <a:tcPr marL="8401" marR="8401" marT="8401" marB="0" anchor="b">
-                    <a:lnL w="6350" cap="flat" cmpd="sng" algn="ctr">
-                      <a:solidFill>
-                        <a:srgbClr val="000000"/>
-                      </a:solidFill>
-                      <a:prstDash val="solid"/>
-                      <a:round/>
-                      <a:headEnd type="none" w="med" len="med"/>
-                      <a:tailEnd type="none" w="med" len="med"/>
-                    </a:lnL>
-                    <a:lnR w="6350" cap="flat" cmpd="sng" algn="ctr">
-                      <a:solidFill>
-                        <a:srgbClr val="000000"/>
-                      </a:solidFill>
-                      <a:prstDash val="solid"/>
-                      <a:round/>
-                      <a:headEnd type="none" w="med" len="med"/>
-                      <a:tailEnd type="none" w="med" len="med"/>
-                    </a:lnR>
-                    <a:lnT w="6350" cap="flat" cmpd="sng" algn="ctr">
-                      <a:solidFill>
-                        <a:srgbClr val="000000"/>
-                      </a:solidFill>
-                      <a:prstDash val="solid"/>
-                      <a:round/>
-                      <a:headEnd type="none" w="med" len="med"/>
-                      <a:tailEnd type="none" w="med" len="med"/>
-                    </a:lnT>
-                    <a:lnB w="6350" cap="flat" cmpd="sng" algn="ctr">
-                      <a:solidFill>
-                        <a:srgbClr val="000000"/>
-                      </a:solidFill>
-                      <a:prstDash val="solid"/>
-                      <a:round/>
-                      <a:headEnd type="none" w="med" len="med"/>
-                      <a:tailEnd type="none" w="med" len="med"/>
-                    </a:lnB>
-                    <a:solidFill>
-                      <a:schemeClr val="tx1"/>
-                    </a:solidFill>
-                  </a:tcPr>
-                </a:tc>
-                <a:tc>
-                  <a:txBody>
-                    <a:bodyPr/>
-                    <a:lstStyle/>
-                    <a:p>
-                      <a:pPr algn="l" fontAlgn="b"/>
-                      <a:r>
-                        <a:rPr lang="en-US" sz="1450" b="0" i="0" u="none" strike="noStrike" dirty="0">
-                          <a:solidFill>
-                            <a:srgbClr val="000000"/>
-                          </a:solidFill>
-                          <a:effectLst/>
-                          <a:latin typeface="+mn-lt"/>
-                        </a:rPr>
-                        <a:t>Accounts for less than 5% of the data-Correlation: Weak</a:t>
-                      </a:r>
-                    </a:p>
-                  </a:txBody>
-                  <a:tcPr marL="8401" marR="8401" marT="8401" marB="0" anchor="b">
-                    <a:lnL w="6350" cap="flat" cmpd="sng" algn="ctr">
-                      <a:solidFill>
-                        <a:srgbClr val="000000"/>
-                      </a:solidFill>
-                      <a:prstDash val="solid"/>
-                      <a:round/>
-                      <a:headEnd type="none" w="med" len="med"/>
-                      <a:tailEnd type="none" w="med" len="med"/>
-                    </a:lnL>
-                    <a:lnR w="6350" cap="flat" cmpd="sng" algn="ctr">
-                      <a:solidFill>
-                        <a:srgbClr val="000000"/>
-                      </a:solidFill>
-                      <a:prstDash val="solid"/>
-                      <a:round/>
-                      <a:headEnd type="none" w="med" len="med"/>
-                      <a:tailEnd type="none" w="med" len="med"/>
-                    </a:lnR>
-                    <a:lnT w="6350" cap="flat" cmpd="sng" algn="ctr">
-                      <a:solidFill>
-                        <a:srgbClr val="000000"/>
-                      </a:solidFill>
-                      <a:prstDash val="solid"/>
-                      <a:round/>
-                      <a:headEnd type="none" w="med" len="med"/>
-                      <a:tailEnd type="none" w="med" len="med"/>
-                    </a:lnT>
-                    <a:lnB w="6350" cap="flat" cmpd="sng" algn="ctr">
-                      <a:solidFill>
-                        <a:srgbClr val="000000"/>
-                      </a:solidFill>
-                      <a:prstDash val="solid"/>
-                      <a:round/>
-                      <a:headEnd type="none" w="med" len="med"/>
-                      <a:tailEnd type="none" w="med" len="med"/>
-                    </a:lnB>
-                    <a:solidFill>
-                      <a:schemeClr val="tx1"/>
-                    </a:solidFill>
-                  </a:tcPr>
-                </a:tc>
-                <a:extLst>
-                  <a:ext uri="{0D108BD9-81ED-4DB2-BD59-A6C34878D82A}">
-                    <a16:rowId xmlns:a16="http://schemas.microsoft.com/office/drawing/2014/main" val="3705265917"/>
-                  </a:ext>
-                </a:extLst>
-              </a:tr>
-            </a:tbl>
-          </a:graphicData>
-        </a:graphic>
-      </p:graphicFrame>
-      <p:graphicFrame>
-        <p:nvGraphicFramePr>
           <p:cNvPr id="6" name="Table 5">
             <a:extLst>
               <a:ext uri="{FF2B5EF4-FFF2-40B4-BE49-F238E27FC236}">
@@ -10510,13 +8964,13 @@
           <p:nvPr>
             <p:extLst>
               <p:ext uri="{D42A27DB-BD31-4B8C-83A1-F6EECF244321}">
-                <p14:modId xmlns:p14="http://schemas.microsoft.com/office/powerpoint/2010/main" val="2173969702"/>
+                <p14:modId xmlns:p14="http://schemas.microsoft.com/office/powerpoint/2010/main" val="4245258281"/>
               </p:ext>
             </p:extLst>
           </p:nvPr>
         </p:nvGraphicFramePr>
         <p:xfrm>
-          <a:off x="7520977" y="872658"/>
+          <a:off x="7334868" y="690321"/>
           <a:ext cx="4397328" cy="1895873"/>
         </p:xfrm>
         <a:graphic>
@@ -11364,21 +9818,1940 @@
         </p:blipFill>
         <p:spPr>
           <a:xfrm>
-            <a:off x="4294209" y="872658"/>
-            <a:ext cx="2247034" cy="2247034"/>
+            <a:off x="3993266" y="584344"/>
+            <a:ext cx="2353011" cy="2353011"/>
           </a:xfrm>
           <a:prstGeom prst="rect">
             <a:avLst/>
           </a:prstGeom>
           <a:effectLst>
-            <a:outerShdw blurRad="50800" dist="38100" dir="13500000" algn="br" rotWithShape="0">
+            <a:innerShdw blurRad="63500" dist="50800" dir="13500000">
               <a:prstClr val="black">
-                <a:alpha val="40000"/>
+                <a:alpha val="50000"/>
               </a:prstClr>
-            </a:outerShdw>
+            </a:innerShdw>
           </a:effectLst>
         </p:spPr>
       </p:pic>
+      <p:graphicFrame>
+        <p:nvGraphicFramePr>
+          <p:cNvPr id="4" name="Table 3">
+            <a:extLst>
+              <a:ext uri="{FF2B5EF4-FFF2-40B4-BE49-F238E27FC236}">
+                <a16:creationId xmlns:a16="http://schemas.microsoft.com/office/drawing/2014/main" id="{4627C27B-2358-BA47-8EBD-A18DAFC9D901}"/>
+              </a:ext>
+            </a:extLst>
+          </p:cNvPr>
+          <p:cNvGraphicFramePr>
+            <a:graphicFrameLocks noGrp="1"/>
+          </p:cNvGraphicFramePr>
+          <p:nvPr>
+            <p:extLst>
+              <p:ext uri="{D42A27DB-BD31-4B8C-83A1-F6EECF244321}">
+                <p14:modId xmlns:p14="http://schemas.microsoft.com/office/powerpoint/2010/main" val="1692003027"/>
+              </p:ext>
+            </p:extLst>
+          </p:nvPr>
+        </p:nvGraphicFramePr>
+        <p:xfrm>
+          <a:off x="81023" y="2937356"/>
+          <a:ext cx="12023390" cy="3613915"/>
+        </p:xfrm>
+        <a:graphic>
+          <a:graphicData uri="http://schemas.openxmlformats.org/drawingml/2006/table">
+            <a:tbl>
+              <a:tblPr>
+                <a:effectLst>
+                  <a:innerShdw blurRad="63500" dist="50800" dir="18900000">
+                    <a:prstClr val="black">
+                      <a:alpha val="50000"/>
+                    </a:prstClr>
+                  </a:innerShdw>
+                </a:effectLst>
+              </a:tblPr>
+              <a:tblGrid>
+                <a:gridCol w="2591731">
+                  <a:extLst>
+                    <a:ext uri="{9D8B030D-6E8A-4147-A177-3AD203B41FA5}">
+                      <a16:colId xmlns:a16="http://schemas.microsoft.com/office/drawing/2014/main" val="897188322"/>
+                    </a:ext>
+                  </a:extLst>
+                </a:gridCol>
+                <a:gridCol w="897040">
+                  <a:extLst>
+                    <a:ext uri="{9D8B030D-6E8A-4147-A177-3AD203B41FA5}">
+                      <a16:colId xmlns:a16="http://schemas.microsoft.com/office/drawing/2014/main" val="1809323920"/>
+                    </a:ext>
+                  </a:extLst>
+                </a:gridCol>
+                <a:gridCol w="1111107">
+                  <a:extLst>
+                    <a:ext uri="{9D8B030D-6E8A-4147-A177-3AD203B41FA5}">
+                      <a16:colId xmlns:a16="http://schemas.microsoft.com/office/drawing/2014/main" val="2389632406"/>
+                    </a:ext>
+                  </a:extLst>
+                </a:gridCol>
+                <a:gridCol w="1827208">
+                  <a:extLst>
+                    <a:ext uri="{9D8B030D-6E8A-4147-A177-3AD203B41FA5}">
+                      <a16:colId xmlns:a16="http://schemas.microsoft.com/office/drawing/2014/main" val="3882632575"/>
+                    </a:ext>
+                  </a:extLst>
+                </a:gridCol>
+                <a:gridCol w="5596304">
+                  <a:extLst>
+                    <a:ext uri="{9D8B030D-6E8A-4147-A177-3AD203B41FA5}">
+                      <a16:colId xmlns:a16="http://schemas.microsoft.com/office/drawing/2014/main" val="3497280623"/>
+                    </a:ext>
+                  </a:extLst>
+                </a:gridCol>
+              </a:tblGrid>
+              <a:tr h="717265">
+                <a:tc>
+                  <a:txBody>
+                    <a:bodyPr/>
+                    <a:lstStyle/>
+                    <a:p>
+                      <a:pPr algn="ctr" fontAlgn="b"/>
+                      <a:r>
+                        <a:rPr lang="en-US" sz="1400" b="1" i="0" u="none" strike="noStrike" dirty="0">
+                          <a:solidFill>
+                            <a:srgbClr val="000000"/>
+                          </a:solidFill>
+                          <a:effectLst/>
+                          <a:latin typeface="+mn-lt"/>
+                        </a:rPr>
+                        <a:t>Relationship</a:t>
+                      </a:r>
+                    </a:p>
+                  </a:txBody>
+                  <a:tcPr marL="6720" marR="6720" marT="6720" marB="0" anchor="b">
+                    <a:lnL w="6350" cap="flat" cmpd="sng" algn="ctr">
+                      <a:solidFill>
+                        <a:srgbClr val="000000"/>
+                      </a:solidFill>
+                      <a:prstDash val="solid"/>
+                      <a:round/>
+                      <a:headEnd type="none" w="med" len="med"/>
+                      <a:tailEnd type="none" w="med" len="med"/>
+                    </a:lnL>
+                    <a:lnR w="6350" cap="flat" cmpd="sng" algn="ctr">
+                      <a:solidFill>
+                        <a:srgbClr val="000000"/>
+                      </a:solidFill>
+                      <a:prstDash val="solid"/>
+                      <a:round/>
+                      <a:headEnd type="none" w="med" len="med"/>
+                      <a:tailEnd type="none" w="med" len="med"/>
+                    </a:lnR>
+                    <a:lnT w="6350" cap="flat" cmpd="sng" algn="ctr">
+                      <a:solidFill>
+                        <a:srgbClr val="000000"/>
+                      </a:solidFill>
+                      <a:prstDash val="solid"/>
+                      <a:round/>
+                      <a:headEnd type="none" w="med" len="med"/>
+                      <a:tailEnd type="none" w="med" len="med"/>
+                    </a:lnT>
+                    <a:lnB w="6350" cap="flat" cmpd="sng" algn="ctr">
+                      <a:solidFill>
+                        <a:srgbClr val="000000"/>
+                      </a:solidFill>
+                      <a:prstDash val="solid"/>
+                      <a:round/>
+                      <a:headEnd type="none" w="med" len="med"/>
+                      <a:tailEnd type="none" w="med" len="med"/>
+                    </a:lnB>
+                    <a:solidFill>
+                      <a:schemeClr val="tx1"/>
+                    </a:solidFill>
+                  </a:tcPr>
+                </a:tc>
+                <a:tc>
+                  <a:txBody>
+                    <a:bodyPr/>
+                    <a:lstStyle/>
+                    <a:p>
+                      <a:pPr algn="ctr" fontAlgn="b"/>
+                      <a:r>
+                        <a:rPr lang="en-US" sz="1400" b="1" i="0" u="none" strike="noStrike" dirty="0">
+                          <a:solidFill>
+                            <a:srgbClr val="000000"/>
+                          </a:solidFill>
+                          <a:effectLst/>
+                          <a:latin typeface="+mn-lt"/>
+                        </a:rPr>
+                        <a:t>R²</a:t>
+                      </a:r>
+                    </a:p>
+                  </a:txBody>
+                  <a:tcPr marL="6720" marR="6720" marT="6720" marB="0" anchor="b">
+                    <a:lnL w="6350" cap="flat" cmpd="sng" algn="ctr">
+                      <a:solidFill>
+                        <a:srgbClr val="000000"/>
+                      </a:solidFill>
+                      <a:prstDash val="solid"/>
+                      <a:round/>
+                      <a:headEnd type="none" w="med" len="med"/>
+                      <a:tailEnd type="none" w="med" len="med"/>
+                    </a:lnL>
+                    <a:lnR w="6350" cap="flat" cmpd="sng" algn="ctr">
+                      <a:solidFill>
+                        <a:srgbClr val="000000"/>
+                      </a:solidFill>
+                      <a:prstDash val="solid"/>
+                      <a:round/>
+                      <a:headEnd type="none" w="med" len="med"/>
+                      <a:tailEnd type="none" w="med" len="med"/>
+                    </a:lnR>
+                    <a:lnT w="6350" cap="flat" cmpd="sng" algn="ctr">
+                      <a:solidFill>
+                        <a:srgbClr val="000000"/>
+                      </a:solidFill>
+                      <a:prstDash val="solid"/>
+                      <a:round/>
+                      <a:headEnd type="none" w="med" len="med"/>
+                      <a:tailEnd type="none" w="med" len="med"/>
+                    </a:lnT>
+                    <a:lnB w="6350" cap="flat" cmpd="sng" algn="ctr">
+                      <a:solidFill>
+                        <a:srgbClr val="000000"/>
+                      </a:solidFill>
+                      <a:prstDash val="solid"/>
+                      <a:round/>
+                      <a:headEnd type="none" w="med" len="med"/>
+                      <a:tailEnd type="none" w="med" len="med"/>
+                    </a:lnB>
+                    <a:solidFill>
+                      <a:schemeClr val="tx1"/>
+                    </a:solidFill>
+                  </a:tcPr>
+                </a:tc>
+                <a:tc>
+                  <a:txBody>
+                    <a:bodyPr/>
+                    <a:lstStyle/>
+                    <a:p>
+                      <a:pPr algn="ctr" fontAlgn="b"/>
+                      <a:r>
+                        <a:rPr lang="en-US" sz="1400" b="1" i="0" u="none" strike="noStrike" dirty="0">
+                          <a:solidFill>
+                            <a:srgbClr val="000000"/>
+                          </a:solidFill>
+                          <a:effectLst/>
+                          <a:latin typeface="+mn-lt"/>
+                        </a:rPr>
+                        <a:t>Pearson's r</a:t>
+                      </a:r>
+                    </a:p>
+                  </a:txBody>
+                  <a:tcPr marL="6720" marR="6720" marT="6720" marB="0" anchor="b">
+                    <a:lnL w="6350" cap="flat" cmpd="sng" algn="ctr">
+                      <a:solidFill>
+                        <a:srgbClr val="000000"/>
+                      </a:solidFill>
+                      <a:prstDash val="solid"/>
+                      <a:round/>
+                      <a:headEnd type="none" w="med" len="med"/>
+                      <a:tailEnd type="none" w="med" len="med"/>
+                    </a:lnL>
+                    <a:lnR w="6350" cap="flat" cmpd="sng" algn="ctr">
+                      <a:solidFill>
+                        <a:srgbClr val="000000"/>
+                      </a:solidFill>
+                      <a:prstDash val="solid"/>
+                      <a:round/>
+                      <a:headEnd type="none" w="med" len="med"/>
+                      <a:tailEnd type="none" w="med" len="med"/>
+                    </a:lnR>
+                    <a:lnT w="6350" cap="flat" cmpd="sng" algn="ctr">
+                      <a:solidFill>
+                        <a:srgbClr val="000000"/>
+                      </a:solidFill>
+                      <a:prstDash val="solid"/>
+                      <a:round/>
+                      <a:headEnd type="none" w="med" len="med"/>
+                      <a:tailEnd type="none" w="med" len="med"/>
+                    </a:lnT>
+                    <a:lnB w="6350" cap="flat" cmpd="sng" algn="ctr">
+                      <a:solidFill>
+                        <a:srgbClr val="000000"/>
+                      </a:solidFill>
+                      <a:prstDash val="solid"/>
+                      <a:round/>
+                      <a:headEnd type="none" w="med" len="med"/>
+                      <a:tailEnd type="none" w="med" len="med"/>
+                    </a:lnB>
+                    <a:solidFill>
+                      <a:schemeClr val="tx1"/>
+                    </a:solidFill>
+                  </a:tcPr>
+                </a:tc>
+                <a:tc>
+                  <a:txBody>
+                    <a:bodyPr/>
+                    <a:lstStyle/>
+                    <a:p>
+                      <a:pPr algn="ctr" fontAlgn="b"/>
+                      <a:r>
+                        <a:rPr lang="en-US" sz="1400" b="1" i="0" u="none" strike="noStrike" dirty="0">
+                          <a:solidFill>
+                            <a:srgbClr val="000000"/>
+                          </a:solidFill>
+                          <a:effectLst/>
+                          <a:latin typeface="+mn-lt"/>
+                        </a:rPr>
+                        <a:t>P Value</a:t>
+                      </a:r>
+                    </a:p>
+                  </a:txBody>
+                  <a:tcPr marL="6720" marR="6720" marT="6720" marB="0" anchor="b">
+                    <a:lnL w="6350" cap="flat" cmpd="sng" algn="ctr">
+                      <a:solidFill>
+                        <a:srgbClr val="000000"/>
+                      </a:solidFill>
+                      <a:prstDash val="solid"/>
+                      <a:round/>
+                      <a:headEnd type="none" w="med" len="med"/>
+                      <a:tailEnd type="none" w="med" len="med"/>
+                    </a:lnL>
+                    <a:lnR w="6350" cap="flat" cmpd="sng" algn="ctr">
+                      <a:solidFill>
+                        <a:srgbClr val="000000"/>
+                      </a:solidFill>
+                      <a:prstDash val="solid"/>
+                      <a:round/>
+                      <a:headEnd type="none" w="med" len="med"/>
+                      <a:tailEnd type="none" w="med" len="med"/>
+                    </a:lnR>
+                    <a:lnT w="6350" cap="flat" cmpd="sng" algn="ctr">
+                      <a:solidFill>
+                        <a:srgbClr val="000000"/>
+                      </a:solidFill>
+                      <a:prstDash val="solid"/>
+                      <a:round/>
+                      <a:headEnd type="none" w="med" len="med"/>
+                      <a:tailEnd type="none" w="med" len="med"/>
+                    </a:lnT>
+                    <a:lnB w="6350" cap="flat" cmpd="sng" algn="ctr">
+                      <a:solidFill>
+                        <a:srgbClr val="000000"/>
+                      </a:solidFill>
+                      <a:prstDash val="solid"/>
+                      <a:round/>
+                      <a:headEnd type="none" w="med" len="med"/>
+                      <a:tailEnd type="none" w="med" len="med"/>
+                    </a:lnB>
+                    <a:solidFill>
+                      <a:schemeClr val="tx1"/>
+                    </a:solidFill>
+                  </a:tcPr>
+                </a:tc>
+                <a:tc>
+                  <a:txBody>
+                    <a:bodyPr/>
+                    <a:lstStyle/>
+                    <a:p>
+                      <a:pPr algn="ctr" fontAlgn="b"/>
+                      <a:r>
+                        <a:rPr lang="en-US" sz="1400" b="1" i="0" u="none" strike="noStrike" dirty="0">
+                          <a:solidFill>
+                            <a:srgbClr val="000000"/>
+                          </a:solidFill>
+                          <a:effectLst/>
+                          <a:latin typeface="+mn-lt"/>
+                        </a:rPr>
+                        <a:t>Meaning</a:t>
+                      </a:r>
+                    </a:p>
+                  </a:txBody>
+                  <a:tcPr marL="6720" marR="6720" marT="6720" marB="0" anchor="b">
+                    <a:lnL w="6350" cap="flat" cmpd="sng" algn="ctr">
+                      <a:solidFill>
+                        <a:srgbClr val="000000"/>
+                      </a:solidFill>
+                      <a:prstDash val="solid"/>
+                      <a:round/>
+                      <a:headEnd type="none" w="med" len="med"/>
+                      <a:tailEnd type="none" w="med" len="med"/>
+                    </a:lnL>
+                    <a:lnR w="6350" cap="flat" cmpd="sng" algn="ctr">
+                      <a:solidFill>
+                        <a:srgbClr val="000000"/>
+                      </a:solidFill>
+                      <a:prstDash val="solid"/>
+                      <a:round/>
+                      <a:headEnd type="none" w="med" len="med"/>
+                      <a:tailEnd type="none" w="med" len="med"/>
+                    </a:lnR>
+                    <a:lnT w="6350" cap="flat" cmpd="sng" algn="ctr">
+                      <a:solidFill>
+                        <a:srgbClr val="000000"/>
+                      </a:solidFill>
+                      <a:prstDash val="solid"/>
+                      <a:round/>
+                      <a:headEnd type="none" w="med" len="med"/>
+                      <a:tailEnd type="none" w="med" len="med"/>
+                    </a:lnT>
+                    <a:lnB w="6350" cap="flat" cmpd="sng" algn="ctr">
+                      <a:solidFill>
+                        <a:srgbClr val="000000"/>
+                      </a:solidFill>
+                      <a:prstDash val="solid"/>
+                      <a:round/>
+                      <a:headEnd type="none" w="med" len="med"/>
+                      <a:tailEnd type="none" w="med" len="med"/>
+                    </a:lnB>
+                    <a:solidFill>
+                      <a:schemeClr val="tx1"/>
+                    </a:solidFill>
+                  </a:tcPr>
+                </a:tc>
+                <a:extLst>
+                  <a:ext uri="{0D108BD9-81ED-4DB2-BD59-A6C34878D82A}">
+                    <a16:rowId xmlns:a16="http://schemas.microsoft.com/office/drawing/2014/main" val="3717183638"/>
+                  </a:ext>
+                </a:extLst>
+              </a:tr>
+              <a:tr h="579330">
+                <a:tc>
+                  <a:txBody>
+                    <a:bodyPr/>
+                    <a:lstStyle/>
+                    <a:p>
+                      <a:pPr algn="l" fontAlgn="b"/>
+                      <a:r>
+                        <a:rPr lang="en-US" sz="1300" b="0" i="0" u="none" strike="noStrike">
+                          <a:solidFill>
+                            <a:srgbClr val="000000"/>
+                          </a:solidFill>
+                          <a:effectLst/>
+                          <a:latin typeface="+mn-lt"/>
+                        </a:rPr>
+                        <a:t>Auto Sales v Gas Price</a:t>
+                      </a:r>
+                    </a:p>
+                  </a:txBody>
+                  <a:tcPr marL="6720" marR="6720" marT="6720" marB="0" anchor="b">
+                    <a:lnL w="6350" cap="flat" cmpd="sng" algn="ctr">
+                      <a:solidFill>
+                        <a:srgbClr val="000000"/>
+                      </a:solidFill>
+                      <a:prstDash val="solid"/>
+                      <a:round/>
+                      <a:headEnd type="none" w="med" len="med"/>
+                      <a:tailEnd type="none" w="med" len="med"/>
+                    </a:lnL>
+                    <a:lnR w="6350" cap="flat" cmpd="sng" algn="ctr">
+                      <a:solidFill>
+                        <a:srgbClr val="000000"/>
+                      </a:solidFill>
+                      <a:prstDash val="solid"/>
+                      <a:round/>
+                      <a:headEnd type="none" w="med" len="med"/>
+                      <a:tailEnd type="none" w="med" len="med"/>
+                    </a:lnR>
+                    <a:lnT w="6350" cap="flat" cmpd="sng" algn="ctr">
+                      <a:solidFill>
+                        <a:srgbClr val="000000"/>
+                      </a:solidFill>
+                      <a:prstDash val="solid"/>
+                      <a:round/>
+                      <a:headEnd type="none" w="med" len="med"/>
+                      <a:tailEnd type="none" w="med" len="med"/>
+                    </a:lnT>
+                    <a:lnB w="6350" cap="flat" cmpd="sng" algn="ctr">
+                      <a:solidFill>
+                        <a:srgbClr val="000000"/>
+                      </a:solidFill>
+                      <a:prstDash val="solid"/>
+                      <a:round/>
+                      <a:headEnd type="none" w="med" len="med"/>
+                      <a:tailEnd type="none" w="med" len="med"/>
+                    </a:lnB>
+                    <a:solidFill>
+                      <a:schemeClr val="tx1"/>
+                    </a:solidFill>
+                  </a:tcPr>
+                </a:tc>
+                <a:tc>
+                  <a:txBody>
+                    <a:bodyPr/>
+                    <a:lstStyle/>
+                    <a:p>
+                      <a:pPr algn="ctr" fontAlgn="b"/>
+                      <a:r>
+                        <a:rPr lang="en-US" sz="1350" b="0" i="0" u="none" strike="noStrike" dirty="0">
+                          <a:solidFill>
+                            <a:srgbClr val="000000"/>
+                          </a:solidFill>
+                          <a:effectLst/>
+                          <a:latin typeface="+mn-lt"/>
+                        </a:rPr>
+                        <a:t>0.000444</a:t>
+                      </a:r>
+                    </a:p>
+                  </a:txBody>
+                  <a:tcPr marL="6720" marR="6720" marT="6720" marB="0" anchor="b">
+                    <a:lnL w="6350" cap="flat" cmpd="sng" algn="ctr">
+                      <a:solidFill>
+                        <a:srgbClr val="000000"/>
+                      </a:solidFill>
+                      <a:prstDash val="solid"/>
+                      <a:round/>
+                      <a:headEnd type="none" w="med" len="med"/>
+                      <a:tailEnd type="none" w="med" len="med"/>
+                    </a:lnL>
+                    <a:lnR w="6350" cap="flat" cmpd="sng" algn="ctr">
+                      <a:solidFill>
+                        <a:srgbClr val="000000"/>
+                      </a:solidFill>
+                      <a:prstDash val="solid"/>
+                      <a:round/>
+                      <a:headEnd type="none" w="med" len="med"/>
+                      <a:tailEnd type="none" w="med" len="med"/>
+                    </a:lnR>
+                    <a:lnT w="6350" cap="flat" cmpd="sng" algn="ctr">
+                      <a:solidFill>
+                        <a:srgbClr val="000000"/>
+                      </a:solidFill>
+                      <a:prstDash val="solid"/>
+                      <a:round/>
+                      <a:headEnd type="none" w="med" len="med"/>
+                      <a:tailEnd type="none" w="med" len="med"/>
+                    </a:lnT>
+                    <a:lnB w="6350" cap="flat" cmpd="sng" algn="ctr">
+                      <a:solidFill>
+                        <a:srgbClr val="000000"/>
+                      </a:solidFill>
+                      <a:prstDash val="solid"/>
+                      <a:round/>
+                      <a:headEnd type="none" w="med" len="med"/>
+                      <a:tailEnd type="none" w="med" len="med"/>
+                    </a:lnB>
+                    <a:solidFill>
+                      <a:schemeClr val="tx1"/>
+                    </a:solidFill>
+                  </a:tcPr>
+                </a:tc>
+                <a:tc>
+                  <a:txBody>
+                    <a:bodyPr/>
+                    <a:lstStyle/>
+                    <a:p>
+                      <a:pPr algn="ctr" fontAlgn="b"/>
+                      <a:r>
+                        <a:rPr lang="en-US" sz="1350" b="0" i="0" u="none" strike="noStrike" dirty="0">
+                          <a:solidFill>
+                            <a:srgbClr val="000000"/>
+                          </a:solidFill>
+                          <a:effectLst/>
+                          <a:latin typeface="+mn-lt"/>
+                        </a:rPr>
+                        <a:t>-0.02</a:t>
+                      </a:r>
+                    </a:p>
+                  </a:txBody>
+                  <a:tcPr marL="6720" marR="6720" marT="6720" marB="0" anchor="b">
+                    <a:lnL w="6350" cap="flat" cmpd="sng" algn="ctr">
+                      <a:solidFill>
+                        <a:srgbClr val="000000"/>
+                      </a:solidFill>
+                      <a:prstDash val="solid"/>
+                      <a:round/>
+                      <a:headEnd type="none" w="med" len="med"/>
+                      <a:tailEnd type="none" w="med" len="med"/>
+                    </a:lnL>
+                    <a:lnR w="6350" cap="flat" cmpd="sng" algn="ctr">
+                      <a:solidFill>
+                        <a:srgbClr val="000000"/>
+                      </a:solidFill>
+                      <a:prstDash val="solid"/>
+                      <a:round/>
+                      <a:headEnd type="none" w="med" len="med"/>
+                      <a:tailEnd type="none" w="med" len="med"/>
+                    </a:lnR>
+                    <a:lnT w="6350" cap="flat" cmpd="sng" algn="ctr">
+                      <a:solidFill>
+                        <a:srgbClr val="000000"/>
+                      </a:solidFill>
+                      <a:prstDash val="solid"/>
+                      <a:round/>
+                      <a:headEnd type="none" w="med" len="med"/>
+                      <a:tailEnd type="none" w="med" len="med"/>
+                    </a:lnT>
+                    <a:lnB w="6350" cap="flat" cmpd="sng" algn="ctr">
+                      <a:solidFill>
+                        <a:srgbClr val="000000"/>
+                      </a:solidFill>
+                      <a:prstDash val="solid"/>
+                      <a:round/>
+                      <a:headEnd type="none" w="med" len="med"/>
+                      <a:tailEnd type="none" w="med" len="med"/>
+                    </a:lnB>
+                    <a:solidFill>
+                      <a:schemeClr val="tx1"/>
+                    </a:solidFill>
+                  </a:tcPr>
+                </a:tc>
+                <a:tc>
+                  <a:txBody>
+                    <a:bodyPr/>
+                    <a:lstStyle/>
+                    <a:p>
+                      <a:pPr algn="ctr" fontAlgn="b"/>
+                      <a:r>
+                        <a:rPr lang="en-US" sz="1350" b="0" i="0" u="none" strike="noStrike" dirty="0">
+                          <a:solidFill>
+                            <a:srgbClr val="000000"/>
+                          </a:solidFill>
+                          <a:effectLst/>
+                          <a:latin typeface="+mn-lt"/>
+                        </a:rPr>
+                        <a:t>0.768033294</a:t>
+                      </a:r>
+                    </a:p>
+                  </a:txBody>
+                  <a:tcPr marL="6720" marR="6720" marT="6720" marB="0" anchor="b">
+                    <a:lnL w="6350" cap="flat" cmpd="sng" algn="ctr">
+                      <a:solidFill>
+                        <a:srgbClr val="000000"/>
+                      </a:solidFill>
+                      <a:prstDash val="solid"/>
+                      <a:round/>
+                      <a:headEnd type="none" w="med" len="med"/>
+                      <a:tailEnd type="none" w="med" len="med"/>
+                    </a:lnL>
+                    <a:lnR w="6350" cap="flat" cmpd="sng" algn="ctr">
+                      <a:solidFill>
+                        <a:srgbClr val="000000"/>
+                      </a:solidFill>
+                      <a:prstDash val="solid"/>
+                      <a:round/>
+                      <a:headEnd type="none" w="med" len="med"/>
+                      <a:tailEnd type="none" w="med" len="med"/>
+                    </a:lnR>
+                    <a:lnT w="6350" cap="flat" cmpd="sng" algn="ctr">
+                      <a:solidFill>
+                        <a:srgbClr val="000000"/>
+                      </a:solidFill>
+                      <a:prstDash val="solid"/>
+                      <a:round/>
+                      <a:headEnd type="none" w="med" len="med"/>
+                      <a:tailEnd type="none" w="med" len="med"/>
+                    </a:lnT>
+                    <a:lnB w="6350" cap="flat" cmpd="sng" algn="ctr">
+                      <a:solidFill>
+                        <a:srgbClr val="000000"/>
+                      </a:solidFill>
+                      <a:prstDash val="solid"/>
+                      <a:round/>
+                      <a:headEnd type="none" w="med" len="med"/>
+                      <a:tailEnd type="none" w="med" len="med"/>
+                    </a:lnB>
+                    <a:solidFill>
+                      <a:schemeClr val="tx1"/>
+                    </a:solidFill>
+                  </a:tcPr>
+                </a:tc>
+                <a:tc>
+                  <a:txBody>
+                    <a:bodyPr/>
+                    <a:lstStyle/>
+                    <a:p>
+                      <a:pPr algn="l" fontAlgn="b"/>
+                      <a:r>
+                        <a:rPr lang="en-US" sz="1200" b="0" i="0" u="none" strike="noStrike" dirty="0">
+                          <a:solidFill>
+                            <a:srgbClr val="000000"/>
+                          </a:solidFill>
+                          <a:effectLst/>
+                          <a:latin typeface="+mn-lt"/>
+                        </a:rPr>
+                        <a:t>Accounts for hardly any of the data: Correlation: None or very weak   </a:t>
+                      </a:r>
+                    </a:p>
+                  </a:txBody>
+                  <a:tcPr marL="6720" marR="6720" marT="6720" marB="0" anchor="b">
+                    <a:lnL w="6350" cap="flat" cmpd="sng" algn="ctr">
+                      <a:solidFill>
+                        <a:srgbClr val="000000"/>
+                      </a:solidFill>
+                      <a:prstDash val="solid"/>
+                      <a:round/>
+                      <a:headEnd type="none" w="med" len="med"/>
+                      <a:tailEnd type="none" w="med" len="med"/>
+                    </a:lnL>
+                    <a:lnR w="6350" cap="flat" cmpd="sng" algn="ctr">
+                      <a:solidFill>
+                        <a:srgbClr val="000000"/>
+                      </a:solidFill>
+                      <a:prstDash val="solid"/>
+                      <a:round/>
+                      <a:headEnd type="none" w="med" len="med"/>
+                      <a:tailEnd type="none" w="med" len="med"/>
+                    </a:lnR>
+                    <a:lnT w="6350" cap="flat" cmpd="sng" algn="ctr">
+                      <a:solidFill>
+                        <a:srgbClr val="000000"/>
+                      </a:solidFill>
+                      <a:prstDash val="solid"/>
+                      <a:round/>
+                      <a:headEnd type="none" w="med" len="med"/>
+                      <a:tailEnd type="none" w="med" len="med"/>
+                    </a:lnT>
+                    <a:lnB w="6350" cap="flat" cmpd="sng" algn="ctr">
+                      <a:solidFill>
+                        <a:srgbClr val="000000"/>
+                      </a:solidFill>
+                      <a:prstDash val="solid"/>
+                      <a:round/>
+                      <a:headEnd type="none" w="med" len="med"/>
+                      <a:tailEnd type="none" w="med" len="med"/>
+                    </a:lnB>
+                    <a:solidFill>
+                      <a:schemeClr val="tx1"/>
+                    </a:solidFill>
+                  </a:tcPr>
+                </a:tc>
+                <a:extLst>
+                  <a:ext uri="{0D108BD9-81ED-4DB2-BD59-A6C34878D82A}">
+                    <a16:rowId xmlns:a16="http://schemas.microsoft.com/office/drawing/2014/main" val="1825058878"/>
+                  </a:ext>
+                </a:extLst>
+              </a:tr>
+              <a:tr h="579330">
+                <a:tc>
+                  <a:txBody>
+                    <a:bodyPr/>
+                    <a:lstStyle/>
+                    <a:p>
+                      <a:pPr algn="l" fontAlgn="b"/>
+                      <a:r>
+                        <a:rPr lang="en-US" sz="1300" b="0" i="0" u="none" strike="noStrike">
+                          <a:solidFill>
+                            <a:srgbClr val="000000"/>
+                          </a:solidFill>
+                          <a:effectLst/>
+                          <a:latin typeface="+mn-lt"/>
+                        </a:rPr>
+                        <a:t>Auto Sales v Unemployment</a:t>
+                      </a:r>
+                    </a:p>
+                  </a:txBody>
+                  <a:tcPr marL="6720" marR="6720" marT="6720" marB="0" anchor="b">
+                    <a:lnL w="6350" cap="flat" cmpd="sng" algn="ctr">
+                      <a:solidFill>
+                        <a:srgbClr val="000000"/>
+                      </a:solidFill>
+                      <a:prstDash val="solid"/>
+                      <a:round/>
+                      <a:headEnd type="none" w="med" len="med"/>
+                      <a:tailEnd type="none" w="med" len="med"/>
+                    </a:lnL>
+                    <a:lnR w="6350" cap="flat" cmpd="sng" algn="ctr">
+                      <a:solidFill>
+                        <a:srgbClr val="000000"/>
+                      </a:solidFill>
+                      <a:prstDash val="solid"/>
+                      <a:round/>
+                      <a:headEnd type="none" w="med" len="med"/>
+                      <a:tailEnd type="none" w="med" len="med"/>
+                    </a:lnR>
+                    <a:lnT w="6350" cap="flat" cmpd="sng" algn="ctr">
+                      <a:solidFill>
+                        <a:srgbClr val="000000"/>
+                      </a:solidFill>
+                      <a:prstDash val="solid"/>
+                      <a:round/>
+                      <a:headEnd type="none" w="med" len="med"/>
+                      <a:tailEnd type="none" w="med" len="med"/>
+                    </a:lnT>
+                    <a:lnB w="6350" cap="flat" cmpd="sng" algn="ctr">
+                      <a:solidFill>
+                        <a:srgbClr val="000000"/>
+                      </a:solidFill>
+                      <a:prstDash val="solid"/>
+                      <a:round/>
+                      <a:headEnd type="none" w="med" len="med"/>
+                      <a:tailEnd type="none" w="med" len="med"/>
+                    </a:lnB>
+                    <a:solidFill>
+                      <a:schemeClr val="tx1"/>
+                    </a:solidFill>
+                  </a:tcPr>
+                </a:tc>
+                <a:tc>
+                  <a:txBody>
+                    <a:bodyPr/>
+                    <a:lstStyle/>
+                    <a:p>
+                      <a:pPr algn="ctr" fontAlgn="b"/>
+                      <a:r>
+                        <a:rPr lang="en-US" sz="1350" b="0" i="0" u="none" strike="noStrike" dirty="0">
+                          <a:solidFill>
+                            <a:srgbClr val="000000"/>
+                          </a:solidFill>
+                          <a:effectLst/>
+                          <a:latin typeface="+mn-lt"/>
+                        </a:rPr>
+                        <a:t>0.378681</a:t>
+                      </a:r>
+                    </a:p>
+                  </a:txBody>
+                  <a:tcPr marL="6720" marR="6720" marT="6720" marB="0" anchor="b">
+                    <a:lnL w="6350" cap="flat" cmpd="sng" algn="ctr">
+                      <a:solidFill>
+                        <a:srgbClr val="000000"/>
+                      </a:solidFill>
+                      <a:prstDash val="solid"/>
+                      <a:round/>
+                      <a:headEnd type="none" w="med" len="med"/>
+                      <a:tailEnd type="none" w="med" len="med"/>
+                    </a:lnL>
+                    <a:lnR w="6350" cap="flat" cmpd="sng" algn="ctr">
+                      <a:solidFill>
+                        <a:srgbClr val="000000"/>
+                      </a:solidFill>
+                      <a:prstDash val="solid"/>
+                      <a:round/>
+                      <a:headEnd type="none" w="med" len="med"/>
+                      <a:tailEnd type="none" w="med" len="med"/>
+                    </a:lnR>
+                    <a:lnT w="6350" cap="flat" cmpd="sng" algn="ctr">
+                      <a:solidFill>
+                        <a:srgbClr val="000000"/>
+                      </a:solidFill>
+                      <a:prstDash val="solid"/>
+                      <a:round/>
+                      <a:headEnd type="none" w="med" len="med"/>
+                      <a:tailEnd type="none" w="med" len="med"/>
+                    </a:lnT>
+                    <a:lnB w="6350" cap="flat" cmpd="sng" algn="ctr">
+                      <a:solidFill>
+                        <a:srgbClr val="000000"/>
+                      </a:solidFill>
+                      <a:prstDash val="solid"/>
+                      <a:round/>
+                      <a:headEnd type="none" w="med" len="med"/>
+                      <a:tailEnd type="none" w="med" len="med"/>
+                    </a:lnB>
+                    <a:solidFill>
+                      <a:schemeClr val="tx1"/>
+                    </a:solidFill>
+                  </a:tcPr>
+                </a:tc>
+                <a:tc>
+                  <a:txBody>
+                    <a:bodyPr/>
+                    <a:lstStyle/>
+                    <a:p>
+                      <a:pPr algn="ctr" fontAlgn="b"/>
+                      <a:r>
+                        <a:rPr lang="en-US" sz="1350" b="0" i="0" u="none" strike="noStrike" dirty="0">
+                          <a:solidFill>
+                            <a:srgbClr val="000000"/>
+                          </a:solidFill>
+                          <a:effectLst/>
+                          <a:latin typeface="+mn-lt"/>
+                        </a:rPr>
+                        <a:t>-0.62</a:t>
+                      </a:r>
+                    </a:p>
+                  </a:txBody>
+                  <a:tcPr marL="6720" marR="6720" marT="6720" marB="0" anchor="b">
+                    <a:lnL w="6350" cap="flat" cmpd="sng" algn="ctr">
+                      <a:solidFill>
+                        <a:srgbClr val="000000"/>
+                      </a:solidFill>
+                      <a:prstDash val="solid"/>
+                      <a:round/>
+                      <a:headEnd type="none" w="med" len="med"/>
+                      <a:tailEnd type="none" w="med" len="med"/>
+                    </a:lnL>
+                    <a:lnR w="6350" cap="flat" cmpd="sng" algn="ctr">
+                      <a:solidFill>
+                        <a:srgbClr val="000000"/>
+                      </a:solidFill>
+                      <a:prstDash val="solid"/>
+                      <a:round/>
+                      <a:headEnd type="none" w="med" len="med"/>
+                      <a:tailEnd type="none" w="med" len="med"/>
+                    </a:lnR>
+                    <a:lnT w="6350" cap="flat" cmpd="sng" algn="ctr">
+                      <a:solidFill>
+                        <a:srgbClr val="000000"/>
+                      </a:solidFill>
+                      <a:prstDash val="solid"/>
+                      <a:round/>
+                      <a:headEnd type="none" w="med" len="med"/>
+                      <a:tailEnd type="none" w="med" len="med"/>
+                    </a:lnT>
+                    <a:lnB w="6350" cap="flat" cmpd="sng" algn="ctr">
+                      <a:solidFill>
+                        <a:srgbClr val="000000"/>
+                      </a:solidFill>
+                      <a:prstDash val="solid"/>
+                      <a:round/>
+                      <a:headEnd type="none" w="med" len="med"/>
+                      <a:tailEnd type="none" w="med" len="med"/>
+                    </a:lnB>
+                    <a:solidFill>
+                      <a:schemeClr val="tx1"/>
+                    </a:solidFill>
+                  </a:tcPr>
+                </a:tc>
+                <a:tc>
+                  <a:txBody>
+                    <a:bodyPr/>
+                    <a:lstStyle/>
+                    <a:p>
+                      <a:pPr algn="ctr" fontAlgn="b"/>
+                      <a:r>
+                        <a:rPr lang="en-US" sz="1350" b="0" i="0" u="none" strike="noStrike" dirty="0">
+                          <a:solidFill>
+                            <a:srgbClr val="000000"/>
+                          </a:solidFill>
+                          <a:effectLst/>
+                          <a:latin typeface="+mn-lt"/>
+                        </a:rPr>
+                        <a:t>5.09817E-22</a:t>
+                      </a:r>
+                    </a:p>
+                  </a:txBody>
+                  <a:tcPr marL="6720" marR="6720" marT="6720" marB="0" anchor="b">
+                    <a:lnL w="6350" cap="flat" cmpd="sng" algn="ctr">
+                      <a:solidFill>
+                        <a:srgbClr val="000000"/>
+                      </a:solidFill>
+                      <a:prstDash val="solid"/>
+                      <a:round/>
+                      <a:headEnd type="none" w="med" len="med"/>
+                      <a:tailEnd type="none" w="med" len="med"/>
+                    </a:lnL>
+                    <a:lnR w="6350" cap="flat" cmpd="sng" algn="ctr">
+                      <a:solidFill>
+                        <a:srgbClr val="000000"/>
+                      </a:solidFill>
+                      <a:prstDash val="solid"/>
+                      <a:round/>
+                      <a:headEnd type="none" w="med" len="med"/>
+                      <a:tailEnd type="none" w="med" len="med"/>
+                    </a:lnR>
+                    <a:lnT w="6350" cap="flat" cmpd="sng" algn="ctr">
+                      <a:solidFill>
+                        <a:srgbClr val="000000"/>
+                      </a:solidFill>
+                      <a:prstDash val="solid"/>
+                      <a:round/>
+                      <a:headEnd type="none" w="med" len="med"/>
+                      <a:tailEnd type="none" w="med" len="med"/>
+                    </a:lnT>
+                    <a:lnB w="6350" cap="flat" cmpd="sng" algn="ctr">
+                      <a:solidFill>
+                        <a:srgbClr val="000000"/>
+                      </a:solidFill>
+                      <a:prstDash val="solid"/>
+                      <a:round/>
+                      <a:headEnd type="none" w="med" len="med"/>
+                      <a:tailEnd type="none" w="med" len="med"/>
+                    </a:lnB>
+                    <a:solidFill>
+                      <a:schemeClr val="tx1"/>
+                    </a:solidFill>
+                  </a:tcPr>
+                </a:tc>
+                <a:tc>
+                  <a:txBody>
+                    <a:bodyPr/>
+                    <a:lstStyle/>
+                    <a:p>
+                      <a:pPr algn="l" fontAlgn="b"/>
+                      <a:r>
+                        <a:rPr lang="en-US" sz="1200" b="0" i="0" u="none" strike="noStrike" dirty="0">
+                          <a:solidFill>
+                            <a:srgbClr val="000000"/>
+                          </a:solidFill>
+                          <a:effectLst/>
+                          <a:latin typeface="+mn-lt"/>
+                        </a:rPr>
+                        <a:t>Accounts for roughly 38% of the data: Correlation: Moderate</a:t>
+                      </a:r>
+                    </a:p>
+                  </a:txBody>
+                  <a:tcPr marL="6720" marR="6720" marT="6720" marB="0" anchor="b">
+                    <a:lnL w="6350" cap="flat" cmpd="sng" algn="ctr">
+                      <a:solidFill>
+                        <a:srgbClr val="000000"/>
+                      </a:solidFill>
+                      <a:prstDash val="solid"/>
+                      <a:round/>
+                      <a:headEnd type="none" w="med" len="med"/>
+                      <a:tailEnd type="none" w="med" len="med"/>
+                    </a:lnL>
+                    <a:lnR w="6350" cap="flat" cmpd="sng" algn="ctr">
+                      <a:solidFill>
+                        <a:srgbClr val="000000"/>
+                      </a:solidFill>
+                      <a:prstDash val="solid"/>
+                      <a:round/>
+                      <a:headEnd type="none" w="med" len="med"/>
+                      <a:tailEnd type="none" w="med" len="med"/>
+                    </a:lnR>
+                    <a:lnT w="6350" cap="flat" cmpd="sng" algn="ctr">
+                      <a:solidFill>
+                        <a:srgbClr val="000000"/>
+                      </a:solidFill>
+                      <a:prstDash val="solid"/>
+                      <a:round/>
+                      <a:headEnd type="none" w="med" len="med"/>
+                      <a:tailEnd type="none" w="med" len="med"/>
+                    </a:lnT>
+                    <a:lnB w="6350" cap="flat" cmpd="sng" algn="ctr">
+                      <a:solidFill>
+                        <a:srgbClr val="000000"/>
+                      </a:solidFill>
+                      <a:prstDash val="solid"/>
+                      <a:round/>
+                      <a:headEnd type="none" w="med" len="med"/>
+                      <a:tailEnd type="none" w="med" len="med"/>
+                    </a:lnB>
+                    <a:solidFill>
+                      <a:schemeClr val="tx1"/>
+                    </a:solidFill>
+                  </a:tcPr>
+                </a:tc>
+                <a:extLst>
+                  <a:ext uri="{0D108BD9-81ED-4DB2-BD59-A6C34878D82A}">
+                    <a16:rowId xmlns:a16="http://schemas.microsoft.com/office/drawing/2014/main" val="1805397928"/>
+                  </a:ext>
+                </a:extLst>
+              </a:tr>
+              <a:tr h="579330">
+                <a:tc>
+                  <a:txBody>
+                    <a:bodyPr/>
+                    <a:lstStyle/>
+                    <a:p>
+                      <a:pPr algn="l" fontAlgn="b"/>
+                      <a:r>
+                        <a:rPr lang="en-US" sz="1300" b="0" i="0" u="none" strike="noStrike" dirty="0">
+                          <a:solidFill>
+                            <a:srgbClr val="000000"/>
+                          </a:solidFill>
+                          <a:effectLst/>
+                          <a:latin typeface="+mn-lt"/>
+                        </a:rPr>
+                        <a:t>Auto Sales v Steel Price Index</a:t>
+                      </a:r>
+                    </a:p>
+                  </a:txBody>
+                  <a:tcPr marL="6720" marR="6720" marT="6720" marB="0" anchor="b">
+                    <a:lnL w="6350" cap="flat" cmpd="sng" algn="ctr">
+                      <a:solidFill>
+                        <a:srgbClr val="000000"/>
+                      </a:solidFill>
+                      <a:prstDash val="solid"/>
+                      <a:round/>
+                      <a:headEnd type="none" w="med" len="med"/>
+                      <a:tailEnd type="none" w="med" len="med"/>
+                    </a:lnL>
+                    <a:lnR w="6350" cap="flat" cmpd="sng" algn="ctr">
+                      <a:solidFill>
+                        <a:srgbClr val="000000"/>
+                      </a:solidFill>
+                      <a:prstDash val="solid"/>
+                      <a:round/>
+                      <a:headEnd type="none" w="med" len="med"/>
+                      <a:tailEnd type="none" w="med" len="med"/>
+                    </a:lnR>
+                    <a:lnT w="6350" cap="flat" cmpd="sng" algn="ctr">
+                      <a:solidFill>
+                        <a:srgbClr val="000000"/>
+                      </a:solidFill>
+                      <a:prstDash val="solid"/>
+                      <a:round/>
+                      <a:headEnd type="none" w="med" len="med"/>
+                      <a:tailEnd type="none" w="med" len="med"/>
+                    </a:lnT>
+                    <a:lnB w="6350" cap="flat" cmpd="sng" algn="ctr">
+                      <a:solidFill>
+                        <a:srgbClr val="000000"/>
+                      </a:solidFill>
+                      <a:prstDash val="solid"/>
+                      <a:round/>
+                      <a:headEnd type="none" w="med" len="med"/>
+                      <a:tailEnd type="none" w="med" len="med"/>
+                    </a:lnB>
+                    <a:solidFill>
+                      <a:schemeClr val="tx1"/>
+                    </a:solidFill>
+                  </a:tcPr>
+                </a:tc>
+                <a:tc>
+                  <a:txBody>
+                    <a:bodyPr/>
+                    <a:lstStyle/>
+                    <a:p>
+                      <a:pPr algn="ctr" fontAlgn="b"/>
+                      <a:r>
+                        <a:rPr lang="en-US" sz="1350" b="0" i="0" u="none" strike="noStrike">
+                          <a:solidFill>
+                            <a:srgbClr val="000000"/>
+                          </a:solidFill>
+                          <a:effectLst/>
+                          <a:latin typeface="+mn-lt"/>
+                        </a:rPr>
+                        <a:t>0.000751</a:t>
+                      </a:r>
+                    </a:p>
+                  </a:txBody>
+                  <a:tcPr marL="6720" marR="6720" marT="6720" marB="0" anchor="b">
+                    <a:lnL w="6350" cap="flat" cmpd="sng" algn="ctr">
+                      <a:solidFill>
+                        <a:srgbClr val="000000"/>
+                      </a:solidFill>
+                      <a:prstDash val="solid"/>
+                      <a:round/>
+                      <a:headEnd type="none" w="med" len="med"/>
+                      <a:tailEnd type="none" w="med" len="med"/>
+                    </a:lnL>
+                    <a:lnR w="6350" cap="flat" cmpd="sng" algn="ctr">
+                      <a:solidFill>
+                        <a:srgbClr val="000000"/>
+                      </a:solidFill>
+                      <a:prstDash val="solid"/>
+                      <a:round/>
+                      <a:headEnd type="none" w="med" len="med"/>
+                      <a:tailEnd type="none" w="med" len="med"/>
+                    </a:lnR>
+                    <a:lnT w="6350" cap="flat" cmpd="sng" algn="ctr">
+                      <a:solidFill>
+                        <a:srgbClr val="000000"/>
+                      </a:solidFill>
+                      <a:prstDash val="solid"/>
+                      <a:round/>
+                      <a:headEnd type="none" w="med" len="med"/>
+                      <a:tailEnd type="none" w="med" len="med"/>
+                    </a:lnT>
+                    <a:lnB w="6350" cap="flat" cmpd="sng" algn="ctr">
+                      <a:solidFill>
+                        <a:srgbClr val="000000"/>
+                      </a:solidFill>
+                      <a:prstDash val="solid"/>
+                      <a:round/>
+                      <a:headEnd type="none" w="med" len="med"/>
+                      <a:tailEnd type="none" w="med" len="med"/>
+                    </a:lnB>
+                    <a:solidFill>
+                      <a:schemeClr val="tx1"/>
+                    </a:solidFill>
+                  </a:tcPr>
+                </a:tc>
+                <a:tc>
+                  <a:txBody>
+                    <a:bodyPr/>
+                    <a:lstStyle/>
+                    <a:p>
+                      <a:pPr algn="ctr" fontAlgn="b"/>
+                      <a:r>
+                        <a:rPr lang="en-US" sz="1350" b="0" i="0" u="none" strike="noStrike" dirty="0">
+                          <a:solidFill>
+                            <a:srgbClr val="000000"/>
+                          </a:solidFill>
+                          <a:effectLst/>
+                          <a:latin typeface="+mn-lt"/>
+                        </a:rPr>
+                        <a:t>-0.03</a:t>
+                      </a:r>
+                    </a:p>
+                  </a:txBody>
+                  <a:tcPr marL="6720" marR="6720" marT="6720" marB="0" anchor="b">
+                    <a:lnL w="6350" cap="flat" cmpd="sng" algn="ctr">
+                      <a:solidFill>
+                        <a:srgbClr val="000000"/>
+                      </a:solidFill>
+                      <a:prstDash val="solid"/>
+                      <a:round/>
+                      <a:headEnd type="none" w="med" len="med"/>
+                      <a:tailEnd type="none" w="med" len="med"/>
+                    </a:lnL>
+                    <a:lnR w="6350" cap="flat" cmpd="sng" algn="ctr">
+                      <a:solidFill>
+                        <a:srgbClr val="000000"/>
+                      </a:solidFill>
+                      <a:prstDash val="solid"/>
+                      <a:round/>
+                      <a:headEnd type="none" w="med" len="med"/>
+                      <a:tailEnd type="none" w="med" len="med"/>
+                    </a:lnR>
+                    <a:lnT w="6350" cap="flat" cmpd="sng" algn="ctr">
+                      <a:solidFill>
+                        <a:srgbClr val="000000"/>
+                      </a:solidFill>
+                      <a:prstDash val="solid"/>
+                      <a:round/>
+                      <a:headEnd type="none" w="med" len="med"/>
+                      <a:tailEnd type="none" w="med" len="med"/>
+                    </a:lnT>
+                    <a:lnB w="6350" cap="flat" cmpd="sng" algn="ctr">
+                      <a:solidFill>
+                        <a:srgbClr val="000000"/>
+                      </a:solidFill>
+                      <a:prstDash val="solid"/>
+                      <a:round/>
+                      <a:headEnd type="none" w="med" len="med"/>
+                      <a:tailEnd type="none" w="med" len="med"/>
+                    </a:lnB>
+                    <a:solidFill>
+                      <a:schemeClr val="tx1"/>
+                    </a:solidFill>
+                  </a:tcPr>
+                </a:tc>
+                <a:tc>
+                  <a:txBody>
+                    <a:bodyPr/>
+                    <a:lstStyle/>
+                    <a:p>
+                      <a:pPr algn="ctr" fontAlgn="b"/>
+                      <a:r>
+                        <a:rPr lang="en-US" sz="1350" b="0" i="0" u="none" strike="noStrike" dirty="0">
+                          <a:solidFill>
+                            <a:srgbClr val="000000"/>
+                          </a:solidFill>
+                          <a:effectLst/>
+                          <a:latin typeface="+mn-lt"/>
+                        </a:rPr>
+                        <a:t>0.701366116</a:t>
+                      </a:r>
+                    </a:p>
+                  </a:txBody>
+                  <a:tcPr marL="6720" marR="6720" marT="6720" marB="0" anchor="b">
+                    <a:lnL w="6350" cap="flat" cmpd="sng" algn="ctr">
+                      <a:solidFill>
+                        <a:srgbClr val="000000"/>
+                      </a:solidFill>
+                      <a:prstDash val="solid"/>
+                      <a:round/>
+                      <a:headEnd type="none" w="med" len="med"/>
+                      <a:tailEnd type="none" w="med" len="med"/>
+                    </a:lnL>
+                    <a:lnR w="6350" cap="flat" cmpd="sng" algn="ctr">
+                      <a:solidFill>
+                        <a:srgbClr val="000000"/>
+                      </a:solidFill>
+                      <a:prstDash val="solid"/>
+                      <a:round/>
+                      <a:headEnd type="none" w="med" len="med"/>
+                      <a:tailEnd type="none" w="med" len="med"/>
+                    </a:lnR>
+                    <a:lnT w="6350" cap="flat" cmpd="sng" algn="ctr">
+                      <a:solidFill>
+                        <a:srgbClr val="000000"/>
+                      </a:solidFill>
+                      <a:prstDash val="solid"/>
+                      <a:round/>
+                      <a:headEnd type="none" w="med" len="med"/>
+                      <a:tailEnd type="none" w="med" len="med"/>
+                    </a:lnT>
+                    <a:lnB w="6350" cap="flat" cmpd="sng" algn="ctr">
+                      <a:solidFill>
+                        <a:srgbClr val="000000"/>
+                      </a:solidFill>
+                      <a:prstDash val="solid"/>
+                      <a:round/>
+                      <a:headEnd type="none" w="med" len="med"/>
+                      <a:tailEnd type="none" w="med" len="med"/>
+                    </a:lnB>
+                    <a:solidFill>
+                      <a:schemeClr val="tx1"/>
+                    </a:solidFill>
+                  </a:tcPr>
+                </a:tc>
+                <a:tc>
+                  <a:txBody>
+                    <a:bodyPr/>
+                    <a:lstStyle/>
+                    <a:p>
+                      <a:pPr algn="l" fontAlgn="b"/>
+                      <a:r>
+                        <a:rPr lang="en-US" sz="1200" b="0" i="0" u="none" strike="noStrike" dirty="0">
+                          <a:solidFill>
+                            <a:srgbClr val="000000"/>
+                          </a:solidFill>
+                          <a:effectLst/>
+                          <a:latin typeface="+mn-lt"/>
+                        </a:rPr>
+                        <a:t>Accounts for hardly any of the data: Correlation: None, or very Weak</a:t>
+                      </a:r>
+                    </a:p>
+                  </a:txBody>
+                  <a:tcPr marL="6720" marR="6720" marT="6720" marB="0" anchor="b">
+                    <a:lnL w="6350" cap="flat" cmpd="sng" algn="ctr">
+                      <a:solidFill>
+                        <a:srgbClr val="000000"/>
+                      </a:solidFill>
+                      <a:prstDash val="solid"/>
+                      <a:round/>
+                      <a:headEnd type="none" w="med" len="med"/>
+                      <a:tailEnd type="none" w="med" len="med"/>
+                    </a:lnL>
+                    <a:lnR w="6350" cap="flat" cmpd="sng" algn="ctr">
+                      <a:solidFill>
+                        <a:srgbClr val="000000"/>
+                      </a:solidFill>
+                      <a:prstDash val="solid"/>
+                      <a:round/>
+                      <a:headEnd type="none" w="med" len="med"/>
+                      <a:tailEnd type="none" w="med" len="med"/>
+                    </a:lnR>
+                    <a:lnT w="6350" cap="flat" cmpd="sng" algn="ctr">
+                      <a:solidFill>
+                        <a:srgbClr val="000000"/>
+                      </a:solidFill>
+                      <a:prstDash val="solid"/>
+                      <a:round/>
+                      <a:headEnd type="none" w="med" len="med"/>
+                      <a:tailEnd type="none" w="med" len="med"/>
+                    </a:lnT>
+                    <a:lnB w="6350" cap="flat" cmpd="sng" algn="ctr">
+                      <a:solidFill>
+                        <a:srgbClr val="000000"/>
+                      </a:solidFill>
+                      <a:prstDash val="solid"/>
+                      <a:round/>
+                      <a:headEnd type="none" w="med" len="med"/>
+                      <a:tailEnd type="none" w="med" len="med"/>
+                    </a:lnB>
+                    <a:solidFill>
+                      <a:schemeClr val="tx1"/>
+                    </a:solidFill>
+                  </a:tcPr>
+                </a:tc>
+                <a:extLst>
+                  <a:ext uri="{0D108BD9-81ED-4DB2-BD59-A6C34878D82A}">
+                    <a16:rowId xmlns:a16="http://schemas.microsoft.com/office/drawing/2014/main" val="762237614"/>
+                  </a:ext>
+                </a:extLst>
+              </a:tr>
+              <a:tr h="579330">
+                <a:tc>
+                  <a:txBody>
+                    <a:bodyPr/>
+                    <a:lstStyle/>
+                    <a:p>
+                      <a:pPr algn="l" fontAlgn="b"/>
+                      <a:r>
+                        <a:rPr lang="en-US" sz="1300" b="0" i="0" u="none" strike="noStrike">
+                          <a:solidFill>
+                            <a:srgbClr val="000000"/>
+                          </a:solidFill>
+                          <a:effectLst/>
+                          <a:latin typeface="+mn-lt"/>
+                        </a:rPr>
+                        <a:t>Auto Sales v New Vehicle Price Index</a:t>
+                      </a:r>
+                    </a:p>
+                  </a:txBody>
+                  <a:tcPr marL="6720" marR="6720" marT="6720" marB="0" anchor="b">
+                    <a:lnL w="6350" cap="flat" cmpd="sng" algn="ctr">
+                      <a:solidFill>
+                        <a:srgbClr val="000000"/>
+                      </a:solidFill>
+                      <a:prstDash val="solid"/>
+                      <a:round/>
+                      <a:headEnd type="none" w="med" len="med"/>
+                      <a:tailEnd type="none" w="med" len="med"/>
+                    </a:lnL>
+                    <a:lnR w="6350" cap="flat" cmpd="sng" algn="ctr">
+                      <a:solidFill>
+                        <a:srgbClr val="000000"/>
+                      </a:solidFill>
+                      <a:prstDash val="solid"/>
+                      <a:round/>
+                      <a:headEnd type="none" w="med" len="med"/>
+                      <a:tailEnd type="none" w="med" len="med"/>
+                    </a:lnR>
+                    <a:lnT w="6350" cap="flat" cmpd="sng" algn="ctr">
+                      <a:solidFill>
+                        <a:srgbClr val="000000"/>
+                      </a:solidFill>
+                      <a:prstDash val="solid"/>
+                      <a:round/>
+                      <a:headEnd type="none" w="med" len="med"/>
+                      <a:tailEnd type="none" w="med" len="med"/>
+                    </a:lnT>
+                    <a:lnB w="6350" cap="flat" cmpd="sng" algn="ctr">
+                      <a:solidFill>
+                        <a:srgbClr val="000000"/>
+                      </a:solidFill>
+                      <a:prstDash val="solid"/>
+                      <a:round/>
+                      <a:headEnd type="none" w="med" len="med"/>
+                      <a:tailEnd type="none" w="med" len="med"/>
+                    </a:lnB>
+                    <a:solidFill>
+                      <a:schemeClr val="tx1"/>
+                    </a:solidFill>
+                  </a:tcPr>
+                </a:tc>
+                <a:tc>
+                  <a:txBody>
+                    <a:bodyPr/>
+                    <a:lstStyle/>
+                    <a:p>
+                      <a:pPr algn="ctr" fontAlgn="b"/>
+                      <a:r>
+                        <a:rPr lang="en-US" sz="1350" b="0" i="0" u="none" strike="noStrike">
+                          <a:solidFill>
+                            <a:srgbClr val="000000"/>
+                          </a:solidFill>
+                          <a:effectLst/>
+                          <a:latin typeface="+mn-lt"/>
+                        </a:rPr>
+                        <a:t>0.204739</a:t>
+                      </a:r>
+                    </a:p>
+                  </a:txBody>
+                  <a:tcPr marL="6720" marR="6720" marT="6720" marB="0" anchor="b">
+                    <a:lnL w="6350" cap="flat" cmpd="sng" algn="ctr">
+                      <a:solidFill>
+                        <a:srgbClr val="000000"/>
+                      </a:solidFill>
+                      <a:prstDash val="solid"/>
+                      <a:round/>
+                      <a:headEnd type="none" w="med" len="med"/>
+                      <a:tailEnd type="none" w="med" len="med"/>
+                    </a:lnL>
+                    <a:lnR w="6350" cap="flat" cmpd="sng" algn="ctr">
+                      <a:solidFill>
+                        <a:srgbClr val="000000"/>
+                      </a:solidFill>
+                      <a:prstDash val="solid"/>
+                      <a:round/>
+                      <a:headEnd type="none" w="med" len="med"/>
+                      <a:tailEnd type="none" w="med" len="med"/>
+                    </a:lnR>
+                    <a:lnT w="6350" cap="flat" cmpd="sng" algn="ctr">
+                      <a:solidFill>
+                        <a:srgbClr val="000000"/>
+                      </a:solidFill>
+                      <a:prstDash val="solid"/>
+                      <a:round/>
+                      <a:headEnd type="none" w="med" len="med"/>
+                      <a:tailEnd type="none" w="med" len="med"/>
+                    </a:lnT>
+                    <a:lnB w="6350" cap="flat" cmpd="sng" algn="ctr">
+                      <a:solidFill>
+                        <a:srgbClr val="000000"/>
+                      </a:solidFill>
+                      <a:prstDash val="solid"/>
+                      <a:round/>
+                      <a:headEnd type="none" w="med" len="med"/>
+                      <a:tailEnd type="none" w="med" len="med"/>
+                    </a:lnB>
+                    <a:solidFill>
+                      <a:schemeClr val="tx1"/>
+                    </a:solidFill>
+                  </a:tcPr>
+                </a:tc>
+                <a:tc>
+                  <a:txBody>
+                    <a:bodyPr/>
+                    <a:lstStyle/>
+                    <a:p>
+                      <a:pPr algn="ctr" fontAlgn="b"/>
+                      <a:r>
+                        <a:rPr lang="en-US" sz="1350" b="0" i="0" u="none" strike="noStrike" dirty="0">
+                          <a:solidFill>
+                            <a:srgbClr val="000000"/>
+                          </a:solidFill>
+                          <a:effectLst/>
+                          <a:latin typeface="+mn-lt"/>
+                        </a:rPr>
+                        <a:t>0.45</a:t>
+                      </a:r>
+                    </a:p>
+                  </a:txBody>
+                  <a:tcPr marL="6720" marR="6720" marT="6720" marB="0" anchor="b">
+                    <a:lnL w="6350" cap="flat" cmpd="sng" algn="ctr">
+                      <a:solidFill>
+                        <a:srgbClr val="000000"/>
+                      </a:solidFill>
+                      <a:prstDash val="solid"/>
+                      <a:round/>
+                      <a:headEnd type="none" w="med" len="med"/>
+                      <a:tailEnd type="none" w="med" len="med"/>
+                    </a:lnL>
+                    <a:lnR w="6350" cap="flat" cmpd="sng" algn="ctr">
+                      <a:solidFill>
+                        <a:srgbClr val="000000"/>
+                      </a:solidFill>
+                      <a:prstDash val="solid"/>
+                      <a:round/>
+                      <a:headEnd type="none" w="med" len="med"/>
+                      <a:tailEnd type="none" w="med" len="med"/>
+                    </a:lnR>
+                    <a:lnT w="6350" cap="flat" cmpd="sng" algn="ctr">
+                      <a:solidFill>
+                        <a:srgbClr val="000000"/>
+                      </a:solidFill>
+                      <a:prstDash val="solid"/>
+                      <a:round/>
+                      <a:headEnd type="none" w="med" len="med"/>
+                      <a:tailEnd type="none" w="med" len="med"/>
+                    </a:lnT>
+                    <a:lnB w="6350" cap="flat" cmpd="sng" algn="ctr">
+                      <a:solidFill>
+                        <a:srgbClr val="000000"/>
+                      </a:solidFill>
+                      <a:prstDash val="solid"/>
+                      <a:round/>
+                      <a:headEnd type="none" w="med" len="med"/>
+                      <a:tailEnd type="none" w="med" len="med"/>
+                    </a:lnB>
+                    <a:solidFill>
+                      <a:schemeClr val="tx1"/>
+                    </a:solidFill>
+                  </a:tcPr>
+                </a:tc>
+                <a:tc>
+                  <a:txBody>
+                    <a:bodyPr/>
+                    <a:lstStyle/>
+                    <a:p>
+                      <a:pPr algn="ctr" fontAlgn="b"/>
+                      <a:r>
+                        <a:rPr lang="en-US" sz="1350" b="0" i="0" u="none" strike="noStrike" dirty="0">
+                          <a:solidFill>
+                            <a:srgbClr val="000000"/>
+                          </a:solidFill>
+                          <a:effectLst/>
+                          <a:latin typeface="+mn-lt"/>
+                        </a:rPr>
+                        <a:t>2.19503E-11</a:t>
+                      </a:r>
+                    </a:p>
+                  </a:txBody>
+                  <a:tcPr marL="6720" marR="6720" marT="6720" marB="0" anchor="b">
+                    <a:lnL w="6350" cap="flat" cmpd="sng" algn="ctr">
+                      <a:solidFill>
+                        <a:srgbClr val="000000"/>
+                      </a:solidFill>
+                      <a:prstDash val="solid"/>
+                      <a:round/>
+                      <a:headEnd type="none" w="med" len="med"/>
+                      <a:tailEnd type="none" w="med" len="med"/>
+                    </a:lnL>
+                    <a:lnR w="6350" cap="flat" cmpd="sng" algn="ctr">
+                      <a:solidFill>
+                        <a:srgbClr val="000000"/>
+                      </a:solidFill>
+                      <a:prstDash val="solid"/>
+                      <a:round/>
+                      <a:headEnd type="none" w="med" len="med"/>
+                      <a:tailEnd type="none" w="med" len="med"/>
+                    </a:lnR>
+                    <a:lnT w="6350" cap="flat" cmpd="sng" algn="ctr">
+                      <a:solidFill>
+                        <a:srgbClr val="000000"/>
+                      </a:solidFill>
+                      <a:prstDash val="solid"/>
+                      <a:round/>
+                      <a:headEnd type="none" w="med" len="med"/>
+                      <a:tailEnd type="none" w="med" len="med"/>
+                    </a:lnT>
+                    <a:lnB w="6350" cap="flat" cmpd="sng" algn="ctr">
+                      <a:solidFill>
+                        <a:srgbClr val="000000"/>
+                      </a:solidFill>
+                      <a:prstDash val="solid"/>
+                      <a:round/>
+                      <a:headEnd type="none" w="med" len="med"/>
+                      <a:tailEnd type="none" w="med" len="med"/>
+                    </a:lnB>
+                    <a:solidFill>
+                      <a:schemeClr val="tx1"/>
+                    </a:solidFill>
+                  </a:tcPr>
+                </a:tc>
+                <a:tc>
+                  <a:txBody>
+                    <a:bodyPr/>
+                    <a:lstStyle/>
+                    <a:p>
+                      <a:pPr algn="l" fontAlgn="b"/>
+                      <a:r>
+                        <a:rPr lang="en-US" sz="1200" b="0" i="0" u="none" strike="noStrike" dirty="0">
+                          <a:solidFill>
+                            <a:srgbClr val="000000"/>
+                          </a:solidFill>
+                          <a:effectLst/>
+                          <a:latin typeface="+mn-lt"/>
+                        </a:rPr>
+                        <a:t>Accounts for roughly 20% of the data: Correlation: Weak</a:t>
+                      </a:r>
+                    </a:p>
+                  </a:txBody>
+                  <a:tcPr marL="6720" marR="6720" marT="6720" marB="0" anchor="b">
+                    <a:lnL w="6350" cap="flat" cmpd="sng" algn="ctr">
+                      <a:solidFill>
+                        <a:srgbClr val="000000"/>
+                      </a:solidFill>
+                      <a:prstDash val="solid"/>
+                      <a:round/>
+                      <a:headEnd type="none" w="med" len="med"/>
+                      <a:tailEnd type="none" w="med" len="med"/>
+                    </a:lnL>
+                    <a:lnR w="6350" cap="flat" cmpd="sng" algn="ctr">
+                      <a:solidFill>
+                        <a:srgbClr val="000000"/>
+                      </a:solidFill>
+                      <a:prstDash val="solid"/>
+                      <a:round/>
+                      <a:headEnd type="none" w="med" len="med"/>
+                      <a:tailEnd type="none" w="med" len="med"/>
+                    </a:lnR>
+                    <a:lnT w="6350" cap="flat" cmpd="sng" algn="ctr">
+                      <a:solidFill>
+                        <a:srgbClr val="000000"/>
+                      </a:solidFill>
+                      <a:prstDash val="solid"/>
+                      <a:round/>
+                      <a:headEnd type="none" w="med" len="med"/>
+                      <a:tailEnd type="none" w="med" len="med"/>
+                    </a:lnT>
+                    <a:lnB w="6350" cap="flat" cmpd="sng" algn="ctr">
+                      <a:solidFill>
+                        <a:srgbClr val="000000"/>
+                      </a:solidFill>
+                      <a:prstDash val="solid"/>
+                      <a:round/>
+                      <a:headEnd type="none" w="med" len="med"/>
+                      <a:tailEnd type="none" w="med" len="med"/>
+                    </a:lnB>
+                    <a:solidFill>
+                      <a:schemeClr val="tx1"/>
+                    </a:solidFill>
+                  </a:tcPr>
+                </a:tc>
+                <a:extLst>
+                  <a:ext uri="{0D108BD9-81ED-4DB2-BD59-A6C34878D82A}">
+                    <a16:rowId xmlns:a16="http://schemas.microsoft.com/office/drawing/2014/main" val="1461808691"/>
+                  </a:ext>
+                </a:extLst>
+              </a:tr>
+              <a:tr h="579330">
+                <a:tc>
+                  <a:txBody>
+                    <a:bodyPr/>
+                    <a:lstStyle/>
+                    <a:p>
+                      <a:pPr algn="l" fontAlgn="b"/>
+                      <a:r>
+                        <a:rPr lang="en-US" sz="1300" b="0" i="0" u="none" strike="noStrike" dirty="0">
+                          <a:solidFill>
+                            <a:srgbClr val="000000"/>
+                          </a:solidFill>
+                          <a:effectLst/>
+                          <a:latin typeface="+mn-lt"/>
+                        </a:rPr>
+                        <a:t>Auto Sales v Used Vehicle Price Index</a:t>
+                      </a:r>
+                    </a:p>
+                  </a:txBody>
+                  <a:tcPr marL="6720" marR="6720" marT="6720" marB="0" anchor="b">
+                    <a:lnL w="6350" cap="flat" cmpd="sng" algn="ctr">
+                      <a:solidFill>
+                        <a:srgbClr val="000000"/>
+                      </a:solidFill>
+                      <a:prstDash val="solid"/>
+                      <a:round/>
+                      <a:headEnd type="none" w="med" len="med"/>
+                      <a:tailEnd type="none" w="med" len="med"/>
+                    </a:lnL>
+                    <a:lnR w="6350" cap="flat" cmpd="sng" algn="ctr">
+                      <a:solidFill>
+                        <a:srgbClr val="000000"/>
+                      </a:solidFill>
+                      <a:prstDash val="solid"/>
+                      <a:round/>
+                      <a:headEnd type="none" w="med" len="med"/>
+                      <a:tailEnd type="none" w="med" len="med"/>
+                    </a:lnR>
+                    <a:lnT w="6350" cap="flat" cmpd="sng" algn="ctr">
+                      <a:solidFill>
+                        <a:srgbClr val="000000"/>
+                      </a:solidFill>
+                      <a:prstDash val="solid"/>
+                      <a:round/>
+                      <a:headEnd type="none" w="med" len="med"/>
+                      <a:tailEnd type="none" w="med" len="med"/>
+                    </a:lnT>
+                    <a:lnB w="6350" cap="flat" cmpd="sng" algn="ctr">
+                      <a:solidFill>
+                        <a:srgbClr val="000000"/>
+                      </a:solidFill>
+                      <a:prstDash val="solid"/>
+                      <a:round/>
+                      <a:headEnd type="none" w="med" len="med"/>
+                      <a:tailEnd type="none" w="med" len="med"/>
+                    </a:lnB>
+                    <a:solidFill>
+                      <a:schemeClr val="tx1"/>
+                    </a:solidFill>
+                  </a:tcPr>
+                </a:tc>
+                <a:tc>
+                  <a:txBody>
+                    <a:bodyPr/>
+                    <a:lstStyle/>
+                    <a:p>
+                      <a:pPr algn="ctr" fontAlgn="b"/>
+                      <a:r>
+                        <a:rPr lang="en-US" sz="1350" b="0" i="0" u="none" strike="noStrike" dirty="0">
+                          <a:solidFill>
+                            <a:srgbClr val="000000"/>
+                          </a:solidFill>
+                          <a:effectLst/>
+                          <a:latin typeface="+mn-lt"/>
+                        </a:rPr>
+                        <a:t>0.055362</a:t>
+                      </a:r>
+                    </a:p>
+                  </a:txBody>
+                  <a:tcPr marL="6720" marR="6720" marT="6720" marB="0" anchor="b">
+                    <a:lnL w="6350" cap="flat" cmpd="sng" algn="ctr">
+                      <a:solidFill>
+                        <a:srgbClr val="000000"/>
+                      </a:solidFill>
+                      <a:prstDash val="solid"/>
+                      <a:round/>
+                      <a:headEnd type="none" w="med" len="med"/>
+                      <a:tailEnd type="none" w="med" len="med"/>
+                    </a:lnL>
+                    <a:lnR w="6350" cap="flat" cmpd="sng" algn="ctr">
+                      <a:solidFill>
+                        <a:srgbClr val="000000"/>
+                      </a:solidFill>
+                      <a:prstDash val="solid"/>
+                      <a:round/>
+                      <a:headEnd type="none" w="med" len="med"/>
+                      <a:tailEnd type="none" w="med" len="med"/>
+                    </a:lnR>
+                    <a:lnT w="6350" cap="flat" cmpd="sng" algn="ctr">
+                      <a:solidFill>
+                        <a:srgbClr val="000000"/>
+                      </a:solidFill>
+                      <a:prstDash val="solid"/>
+                      <a:round/>
+                      <a:headEnd type="none" w="med" len="med"/>
+                      <a:tailEnd type="none" w="med" len="med"/>
+                    </a:lnT>
+                    <a:lnB w="6350" cap="flat" cmpd="sng" algn="ctr">
+                      <a:solidFill>
+                        <a:srgbClr val="000000"/>
+                      </a:solidFill>
+                      <a:prstDash val="solid"/>
+                      <a:round/>
+                      <a:headEnd type="none" w="med" len="med"/>
+                      <a:tailEnd type="none" w="med" len="med"/>
+                    </a:lnB>
+                    <a:solidFill>
+                      <a:schemeClr val="tx1"/>
+                    </a:solidFill>
+                  </a:tcPr>
+                </a:tc>
+                <a:tc>
+                  <a:txBody>
+                    <a:bodyPr/>
+                    <a:lstStyle/>
+                    <a:p>
+                      <a:pPr algn="ctr" fontAlgn="b"/>
+                      <a:r>
+                        <a:rPr lang="en-US" sz="1350" b="0" i="0" u="none" strike="noStrike" dirty="0">
+                          <a:solidFill>
+                            <a:srgbClr val="000000"/>
+                          </a:solidFill>
+                          <a:effectLst/>
+                          <a:latin typeface="+mn-lt"/>
+                        </a:rPr>
+                        <a:t>0.24</a:t>
+                      </a:r>
+                    </a:p>
+                  </a:txBody>
+                  <a:tcPr marL="6720" marR="6720" marT="6720" marB="0" anchor="b">
+                    <a:lnL w="6350" cap="flat" cmpd="sng" algn="ctr">
+                      <a:solidFill>
+                        <a:srgbClr val="000000"/>
+                      </a:solidFill>
+                      <a:prstDash val="solid"/>
+                      <a:round/>
+                      <a:headEnd type="none" w="med" len="med"/>
+                      <a:tailEnd type="none" w="med" len="med"/>
+                    </a:lnL>
+                    <a:lnR w="6350" cap="flat" cmpd="sng" algn="ctr">
+                      <a:solidFill>
+                        <a:srgbClr val="000000"/>
+                      </a:solidFill>
+                      <a:prstDash val="solid"/>
+                      <a:round/>
+                      <a:headEnd type="none" w="med" len="med"/>
+                      <a:tailEnd type="none" w="med" len="med"/>
+                    </a:lnR>
+                    <a:lnT w="6350" cap="flat" cmpd="sng" algn="ctr">
+                      <a:solidFill>
+                        <a:srgbClr val="000000"/>
+                      </a:solidFill>
+                      <a:prstDash val="solid"/>
+                      <a:round/>
+                      <a:headEnd type="none" w="med" len="med"/>
+                      <a:tailEnd type="none" w="med" len="med"/>
+                    </a:lnT>
+                    <a:lnB w="6350" cap="flat" cmpd="sng" algn="ctr">
+                      <a:solidFill>
+                        <a:srgbClr val="000000"/>
+                      </a:solidFill>
+                      <a:prstDash val="solid"/>
+                      <a:round/>
+                      <a:headEnd type="none" w="med" len="med"/>
+                      <a:tailEnd type="none" w="med" len="med"/>
+                    </a:lnB>
+                    <a:solidFill>
+                      <a:schemeClr val="tx1"/>
+                    </a:solidFill>
+                  </a:tcPr>
+                </a:tc>
+                <a:tc>
+                  <a:txBody>
+                    <a:bodyPr/>
+                    <a:lstStyle/>
+                    <a:p>
+                      <a:pPr algn="ctr" fontAlgn="b"/>
+                      <a:r>
+                        <a:rPr lang="en-US" sz="1350" b="0" i="0" u="none" strike="noStrike" dirty="0">
+                          <a:solidFill>
+                            <a:srgbClr val="000000"/>
+                          </a:solidFill>
+                          <a:effectLst/>
+                          <a:latin typeface="+mn-lt"/>
+                        </a:rPr>
+                        <a:t>0.00084731</a:t>
+                      </a:r>
+                    </a:p>
+                  </a:txBody>
+                  <a:tcPr marL="6720" marR="6720" marT="6720" marB="0" anchor="b">
+                    <a:lnL w="6350" cap="flat" cmpd="sng" algn="ctr">
+                      <a:solidFill>
+                        <a:srgbClr val="000000"/>
+                      </a:solidFill>
+                      <a:prstDash val="solid"/>
+                      <a:round/>
+                      <a:headEnd type="none" w="med" len="med"/>
+                      <a:tailEnd type="none" w="med" len="med"/>
+                    </a:lnL>
+                    <a:lnR w="6350" cap="flat" cmpd="sng" algn="ctr">
+                      <a:solidFill>
+                        <a:srgbClr val="000000"/>
+                      </a:solidFill>
+                      <a:prstDash val="solid"/>
+                      <a:round/>
+                      <a:headEnd type="none" w="med" len="med"/>
+                      <a:tailEnd type="none" w="med" len="med"/>
+                    </a:lnR>
+                    <a:lnT w="6350" cap="flat" cmpd="sng" algn="ctr">
+                      <a:solidFill>
+                        <a:srgbClr val="000000"/>
+                      </a:solidFill>
+                      <a:prstDash val="solid"/>
+                      <a:round/>
+                      <a:headEnd type="none" w="med" len="med"/>
+                      <a:tailEnd type="none" w="med" len="med"/>
+                    </a:lnT>
+                    <a:lnB w="6350" cap="flat" cmpd="sng" algn="ctr">
+                      <a:solidFill>
+                        <a:srgbClr val="000000"/>
+                      </a:solidFill>
+                      <a:prstDash val="solid"/>
+                      <a:round/>
+                      <a:headEnd type="none" w="med" len="med"/>
+                      <a:tailEnd type="none" w="med" len="med"/>
+                    </a:lnB>
+                    <a:solidFill>
+                      <a:schemeClr val="tx1"/>
+                    </a:solidFill>
+                  </a:tcPr>
+                </a:tc>
+                <a:tc>
+                  <a:txBody>
+                    <a:bodyPr/>
+                    <a:lstStyle/>
+                    <a:p>
+                      <a:pPr algn="l" fontAlgn="b"/>
+                      <a:r>
+                        <a:rPr lang="en-US" sz="1200" b="0" i="0" u="none" strike="noStrike" dirty="0">
+                          <a:solidFill>
+                            <a:srgbClr val="000000"/>
+                          </a:solidFill>
+                          <a:effectLst/>
+                          <a:latin typeface="+mn-lt"/>
+                        </a:rPr>
+                        <a:t>Accounts for less than 5% of the data-Correlation: Weak</a:t>
+                      </a:r>
+                    </a:p>
+                  </a:txBody>
+                  <a:tcPr marL="6720" marR="6720" marT="6720" marB="0" anchor="b">
+                    <a:lnL w="6350" cap="flat" cmpd="sng" algn="ctr">
+                      <a:solidFill>
+                        <a:srgbClr val="000000"/>
+                      </a:solidFill>
+                      <a:prstDash val="solid"/>
+                      <a:round/>
+                      <a:headEnd type="none" w="med" len="med"/>
+                      <a:tailEnd type="none" w="med" len="med"/>
+                    </a:lnL>
+                    <a:lnR w="6350" cap="flat" cmpd="sng" algn="ctr">
+                      <a:solidFill>
+                        <a:srgbClr val="000000"/>
+                      </a:solidFill>
+                      <a:prstDash val="solid"/>
+                      <a:round/>
+                      <a:headEnd type="none" w="med" len="med"/>
+                      <a:tailEnd type="none" w="med" len="med"/>
+                    </a:lnR>
+                    <a:lnT w="6350" cap="flat" cmpd="sng" algn="ctr">
+                      <a:solidFill>
+                        <a:srgbClr val="000000"/>
+                      </a:solidFill>
+                      <a:prstDash val="solid"/>
+                      <a:round/>
+                      <a:headEnd type="none" w="med" len="med"/>
+                      <a:tailEnd type="none" w="med" len="med"/>
+                    </a:lnT>
+                    <a:lnB w="6350" cap="flat" cmpd="sng" algn="ctr">
+                      <a:solidFill>
+                        <a:srgbClr val="000000"/>
+                      </a:solidFill>
+                      <a:prstDash val="solid"/>
+                      <a:round/>
+                      <a:headEnd type="none" w="med" len="med"/>
+                      <a:tailEnd type="none" w="med" len="med"/>
+                    </a:lnB>
+                    <a:solidFill>
+                      <a:schemeClr val="tx1"/>
+                    </a:solidFill>
+                  </a:tcPr>
+                </a:tc>
+                <a:extLst>
+                  <a:ext uri="{0D108BD9-81ED-4DB2-BD59-A6C34878D82A}">
+                    <a16:rowId xmlns:a16="http://schemas.microsoft.com/office/drawing/2014/main" val="1286734584"/>
+                  </a:ext>
+                </a:extLst>
+              </a:tr>
+            </a:tbl>
+          </a:graphicData>
+        </a:graphic>
+      </p:graphicFrame>
     </p:spTree>
     <p:extLst>
       <p:ext uri="{BB962C8B-B14F-4D97-AF65-F5344CB8AC3E}">
@@ -11389,6 +11762,138 @@
   <p:clrMapOvr>
     <a:masterClrMapping/>
   </p:clrMapOvr>
+  <p:timing>
+    <p:tnLst>
+      <p:par>
+        <p:cTn id="1" dur="indefinite" restart="never" nodeType="tmRoot">
+          <p:childTnLst>
+            <p:seq concurrent="1" nextAc="seek">
+              <p:cTn id="2" dur="indefinite" nodeType="mainSeq">
+                <p:childTnLst>
+                  <p:par>
+                    <p:cTn id="3" fill="hold">
+                      <p:stCondLst>
+                        <p:cond delay="indefinite"/>
+                        <p:cond evt="onBegin" delay="0">
+                          <p:tn val="2"/>
+                        </p:cond>
+                      </p:stCondLst>
+                      <p:childTnLst>
+                        <p:par>
+                          <p:cTn id="4" fill="hold">
+                            <p:stCondLst>
+                              <p:cond delay="0"/>
+                            </p:stCondLst>
+                            <p:childTnLst>
+                              <p:par>
+                                <p:cTn id="5" presetID="53" presetClass="entr" presetSubtype="16" fill="hold" nodeType="withEffect">
+                                  <p:stCondLst>
+                                    <p:cond delay="0"/>
+                                  </p:stCondLst>
+                                  <p:childTnLst>
+                                    <p:set>
+                                      <p:cBhvr>
+                                        <p:cTn id="6" dur="1" fill="hold">
+                                          <p:stCondLst>
+                                            <p:cond delay="0"/>
+                                          </p:stCondLst>
+                                        </p:cTn>
+                                        <p:tgtEl>
+                                          <p:spTgt spid="7"/>
+                                        </p:tgtEl>
+                                        <p:attrNameLst>
+                                          <p:attrName>style.visibility</p:attrName>
+                                        </p:attrNameLst>
+                                      </p:cBhvr>
+                                      <p:to>
+                                        <p:strVal val="visible"/>
+                                      </p:to>
+                                    </p:set>
+                                    <p:anim calcmode="lin" valueType="num">
+                                      <p:cBhvr>
+                                        <p:cTn id="7" dur="500" fill="hold"/>
+                                        <p:tgtEl>
+                                          <p:spTgt spid="7"/>
+                                        </p:tgtEl>
+                                        <p:attrNameLst>
+                                          <p:attrName>ppt_w</p:attrName>
+                                        </p:attrNameLst>
+                                      </p:cBhvr>
+                                      <p:tavLst>
+                                        <p:tav tm="0">
+                                          <p:val>
+                                            <p:fltVal val="0"/>
+                                          </p:val>
+                                        </p:tav>
+                                        <p:tav tm="100000">
+                                          <p:val>
+                                            <p:strVal val="#ppt_w"/>
+                                          </p:val>
+                                        </p:tav>
+                                      </p:tavLst>
+                                    </p:anim>
+                                    <p:anim calcmode="lin" valueType="num">
+                                      <p:cBhvr>
+                                        <p:cTn id="8" dur="500" fill="hold"/>
+                                        <p:tgtEl>
+                                          <p:spTgt spid="7"/>
+                                        </p:tgtEl>
+                                        <p:attrNameLst>
+                                          <p:attrName>ppt_h</p:attrName>
+                                        </p:attrNameLst>
+                                      </p:cBhvr>
+                                      <p:tavLst>
+                                        <p:tav tm="0">
+                                          <p:val>
+                                            <p:fltVal val="0"/>
+                                          </p:val>
+                                        </p:tav>
+                                        <p:tav tm="100000">
+                                          <p:val>
+                                            <p:strVal val="#ppt_h"/>
+                                          </p:val>
+                                        </p:tav>
+                                      </p:tavLst>
+                                    </p:anim>
+                                    <p:animEffect transition="in" filter="fade">
+                                      <p:cBhvr>
+                                        <p:cTn id="9" dur="500"/>
+                                        <p:tgtEl>
+                                          <p:spTgt spid="7"/>
+                                        </p:tgtEl>
+                                      </p:cBhvr>
+                                    </p:animEffect>
+                                  </p:childTnLst>
+                                </p:cTn>
+                              </p:par>
+                            </p:childTnLst>
+                          </p:cTn>
+                        </p:par>
+                      </p:childTnLst>
+                    </p:cTn>
+                  </p:par>
+                </p:childTnLst>
+              </p:cTn>
+              <p:prevCondLst>
+                <p:cond evt="onPrev" delay="0">
+                  <p:tgtEl>
+                    <p:sldTgt/>
+                  </p:tgtEl>
+                </p:cond>
+              </p:prevCondLst>
+              <p:nextCondLst>
+                <p:cond evt="onNext" delay="0">
+                  <p:tgtEl>
+                    <p:sldTgt/>
+                  </p:tgtEl>
+                </p:cond>
+              </p:nextCondLst>
+            </p:seq>
+          </p:childTnLst>
+        </p:cTn>
+      </p:par>
+    </p:tnLst>
+  </p:timing>
 </p:sld>
 </file>
 
@@ -12873,7 +13378,7 @@
           <a:effectLst/>
           <a:extLst>
             <a:ext uri="{91240B29-F687-4f45-9708-019B960494DF}">
-              <a14:hiddenLine xmlns="" xmlns:a14="http://schemas.microsoft.com/office/drawing/2010/main" xmlns:p14="http://schemas.microsoft.com/office/powerpoint/2010/main" xmlns:a16="http://schemas.microsoft.com/office/drawing/2014/main" w="9525">
+              <a14:hiddenLine xmlns:a16="http://schemas.microsoft.com/office/drawing/2014/main" xmlns:p14="http://schemas.microsoft.com/office/powerpoint/2010/main" xmlns:a14="http://schemas.microsoft.com/office/drawing/2010/main" xmlns="" w="9525">
                 <a:solidFill>
                   <a:srgbClr val="000000"/>
                 </a:solidFill>

</xml_diff>